<commit_message>
Update | Formatter & etc.
</commit_message>
<xml_diff>
--- a/02-스프링 프레임워크 핵심 기술/assets/image.pptx
+++ b/02-스프링 프레임워크 핵심 기술/assets/image.pptx
@@ -3964,6 +3964,35 @@
           <a:chExt cx="0" cy="0"/>
         </a:xfrm>
       </p:grpSpPr>
+      <p:pic>
+        <p:nvPicPr>
+          <p:cNvPr id="2" name="그림 1">
+            <a:extLst>
+              <a:ext uri="{FF2B5EF4-FFF2-40B4-BE49-F238E27FC236}">
+                <a16:creationId xmlns:a16="http://schemas.microsoft.com/office/drawing/2014/main" id="{EA3FF8B7-E47C-C643-BC02-23074D4C018F}"/>
+              </a:ext>
+            </a:extLst>
+          </p:cNvPr>
+          <p:cNvPicPr>
+            <a:picLocks noChangeAspect="1"/>
+          </p:cNvPicPr>
+          <p:nvPr/>
+        </p:nvPicPr>
+        <p:blipFill rotWithShape="1">
+          <a:blip r:embed="rId2"/>
+          <a:srcRect l="12535" t="19099" r="61162" b="35856"/>
+          <a:stretch/>
+        </p:blipFill>
+        <p:spPr>
+          <a:xfrm>
+            <a:off x="3483703" y="881182"/>
+            <a:ext cx="4968318" cy="5377958"/>
+          </a:xfrm>
+          <a:prstGeom prst="rect">
+            <a:avLst/>
+          </a:prstGeom>
+        </p:spPr>
+      </p:pic>
     </p:spTree>
     <p:extLst>
       <p:ext uri="{BB962C8B-B14F-4D97-AF65-F5344CB8AC3E}">
@@ -4024,6 +4053,432 @@
           <a:chExt cx="0" cy="0"/>
         </a:xfrm>
       </p:grpSpPr>
+      <p:sp>
+        <p:nvSpPr>
+          <p:cNvPr id="2" name="TextBox 1">
+            <a:extLst>
+              <a:ext uri="{FF2B5EF4-FFF2-40B4-BE49-F238E27FC236}">
+                <a16:creationId xmlns:a16="http://schemas.microsoft.com/office/drawing/2014/main" id="{95D8167B-BF61-7341-9BB4-3E7A7248748C}"/>
+              </a:ext>
+            </a:extLst>
+          </p:cNvPr>
+          <p:cNvSpPr txBox="1"/>
+          <p:nvPr/>
+        </p:nvSpPr>
+        <p:spPr>
+          <a:xfrm>
+            <a:off x="2718487" y="2829697"/>
+            <a:ext cx="1227772" cy="646331"/>
+          </a:xfrm>
+          <a:prstGeom prst="rect">
+            <a:avLst/>
+          </a:prstGeom>
+          <a:noFill/>
+          <a:ln>
+            <a:solidFill>
+              <a:schemeClr val="bg2">
+                <a:lumMod val="75000"/>
+              </a:schemeClr>
+            </a:solidFill>
+          </a:ln>
+        </p:spPr>
+        <p:txBody>
+          <a:bodyPr wrap="none" rtlCol="0">
+            <a:spAutoFit/>
+          </a:bodyPr>
+          <a:lstStyle/>
+          <a:p>
+            <a:pPr algn="ctr"/>
+            <a:r>
+              <a:rPr kumimoji="1" lang="en-US" altLang="ko-Kore-KR" dirty="0"/>
+              <a:t>Conversion</a:t>
+            </a:r>
+          </a:p>
+          <a:p>
+            <a:pPr algn="ctr"/>
+            <a:r>
+              <a:rPr kumimoji="1" lang="en-US" altLang="ko-Kore-KR" dirty="0"/>
+              <a:t>Service</a:t>
+            </a:r>
+            <a:endParaRPr kumimoji="1" lang="ko-Kore-KR" altLang="en-US" dirty="0"/>
+          </a:p>
+        </p:txBody>
+      </p:sp>
+      <p:sp>
+        <p:nvSpPr>
+          <p:cNvPr id="3" name="TextBox 2">
+            <a:extLst>
+              <a:ext uri="{FF2B5EF4-FFF2-40B4-BE49-F238E27FC236}">
+                <a16:creationId xmlns:a16="http://schemas.microsoft.com/office/drawing/2014/main" id="{36AB6AFB-FC0F-CC4A-A2DA-996A45B0836E}"/>
+              </a:ext>
+            </a:extLst>
+          </p:cNvPr>
+          <p:cNvSpPr txBox="1"/>
+          <p:nvPr/>
+        </p:nvSpPr>
+        <p:spPr>
+          <a:xfrm>
+            <a:off x="5966344" y="1466674"/>
+            <a:ext cx="1115434" cy="646331"/>
+          </a:xfrm>
+          <a:prstGeom prst="rect">
+            <a:avLst/>
+          </a:prstGeom>
+          <a:noFill/>
+          <a:ln>
+            <a:solidFill>
+              <a:schemeClr val="bg2">
+                <a:lumMod val="75000"/>
+              </a:schemeClr>
+            </a:solidFill>
+          </a:ln>
+        </p:spPr>
+        <p:txBody>
+          <a:bodyPr wrap="none" rtlCol="0">
+            <a:spAutoFit/>
+          </a:bodyPr>
+          <a:lstStyle/>
+          <a:p>
+            <a:pPr algn="ctr"/>
+            <a:r>
+              <a:rPr kumimoji="1" lang="en-US" altLang="ko-Kore-KR" dirty="0"/>
+              <a:t>Converter</a:t>
+            </a:r>
+          </a:p>
+          <a:p>
+            <a:pPr algn="ctr"/>
+            <a:r>
+              <a:rPr kumimoji="1" lang="en-US" altLang="ko-Kore-KR" dirty="0"/>
+              <a:t>Registry</a:t>
+            </a:r>
+          </a:p>
+        </p:txBody>
+      </p:sp>
+      <p:sp>
+        <p:nvSpPr>
+          <p:cNvPr id="4" name="TextBox 3">
+            <a:extLst>
+              <a:ext uri="{FF2B5EF4-FFF2-40B4-BE49-F238E27FC236}">
+                <a16:creationId xmlns:a16="http://schemas.microsoft.com/office/drawing/2014/main" id="{E5104C7B-FB03-4F40-9D6C-69B3F56C09C0}"/>
+              </a:ext>
+            </a:extLst>
+          </p:cNvPr>
+          <p:cNvSpPr txBox="1"/>
+          <p:nvPr/>
+        </p:nvSpPr>
+        <p:spPr>
+          <a:xfrm>
+            <a:off x="5955957" y="2829697"/>
+            <a:ext cx="1125821" cy="646331"/>
+          </a:xfrm>
+          <a:prstGeom prst="rect">
+            <a:avLst/>
+          </a:prstGeom>
+          <a:noFill/>
+          <a:ln>
+            <a:solidFill>
+              <a:schemeClr val="bg2">
+                <a:lumMod val="75000"/>
+              </a:schemeClr>
+            </a:solidFill>
+          </a:ln>
+        </p:spPr>
+        <p:txBody>
+          <a:bodyPr wrap="none" rtlCol="0">
+            <a:spAutoFit/>
+          </a:bodyPr>
+          <a:lstStyle/>
+          <a:p>
+            <a:pPr algn="ctr"/>
+            <a:r>
+              <a:rPr kumimoji="1" lang="en-US" altLang="ko-Kore-KR" dirty="0"/>
+              <a:t>Formatter</a:t>
+            </a:r>
+          </a:p>
+          <a:p>
+            <a:pPr algn="ctr"/>
+            <a:r>
+              <a:rPr kumimoji="1" lang="en-US" altLang="ko-Kore-KR" dirty="0"/>
+              <a:t>Registry</a:t>
+            </a:r>
+          </a:p>
+        </p:txBody>
+      </p:sp>
+      <p:sp>
+        <p:nvSpPr>
+          <p:cNvPr id="5" name="TextBox 4">
+            <a:extLst>
+              <a:ext uri="{FF2B5EF4-FFF2-40B4-BE49-F238E27FC236}">
+                <a16:creationId xmlns:a16="http://schemas.microsoft.com/office/drawing/2014/main" id="{B076E696-6C39-7A41-B171-0B677FC86E9C}"/>
+              </a:ext>
+            </a:extLst>
+          </p:cNvPr>
+          <p:cNvSpPr txBox="1"/>
+          <p:nvPr/>
+        </p:nvSpPr>
+        <p:spPr>
+          <a:xfrm>
+            <a:off x="4065503" y="4207984"/>
+            <a:ext cx="1900841" cy="646331"/>
+          </a:xfrm>
+          <a:prstGeom prst="rect">
+            <a:avLst/>
+          </a:prstGeom>
+          <a:noFill/>
+          <a:ln>
+            <a:solidFill>
+              <a:schemeClr val="bg2">
+                <a:lumMod val="75000"/>
+              </a:schemeClr>
+            </a:solidFill>
+          </a:ln>
+        </p:spPr>
+        <p:txBody>
+          <a:bodyPr wrap="none" rtlCol="0">
+            <a:spAutoFit/>
+          </a:bodyPr>
+          <a:lstStyle/>
+          <a:p>
+            <a:pPr algn="ctr"/>
+            <a:r>
+              <a:rPr kumimoji="1" lang="en-US" altLang="ko-Kore-KR" dirty="0" err="1"/>
+              <a:t>DefaultFormatting</a:t>
+            </a:r>
+            <a:endParaRPr kumimoji="1" lang="en-US" altLang="ko-Kore-KR" dirty="0"/>
+          </a:p>
+          <a:p>
+            <a:pPr algn="ctr"/>
+            <a:r>
+              <a:rPr kumimoji="1" lang="en-US" altLang="ko-Kore-KR" dirty="0" err="1"/>
+              <a:t>ConversionService</a:t>
+            </a:r>
+            <a:endParaRPr kumimoji="1" lang="ko-Kore-KR" altLang="en-US" dirty="0"/>
+          </a:p>
+        </p:txBody>
+      </p:sp>
+      <p:sp>
+        <p:nvSpPr>
+          <p:cNvPr id="6" name="TextBox 5">
+            <a:extLst>
+              <a:ext uri="{FF2B5EF4-FFF2-40B4-BE49-F238E27FC236}">
+                <a16:creationId xmlns:a16="http://schemas.microsoft.com/office/drawing/2014/main" id="{80DED452-3663-6141-BBFC-7DE813DBC312}"/>
+              </a:ext>
+            </a:extLst>
+          </p:cNvPr>
+          <p:cNvSpPr txBox="1"/>
+          <p:nvPr/>
+        </p:nvSpPr>
+        <p:spPr>
+          <a:xfrm>
+            <a:off x="3506009" y="5586271"/>
+            <a:ext cx="3041004" cy="461665"/>
+          </a:xfrm>
+          <a:prstGeom prst="rect">
+            <a:avLst/>
+          </a:prstGeom>
+          <a:noFill/>
+          <a:ln>
+            <a:solidFill>
+              <a:schemeClr val="bg2">
+                <a:lumMod val="75000"/>
+              </a:schemeClr>
+            </a:solidFill>
+          </a:ln>
+        </p:spPr>
+        <p:txBody>
+          <a:bodyPr wrap="square" rtlCol="0">
+            <a:spAutoFit/>
+          </a:bodyPr>
+          <a:lstStyle/>
+          <a:p>
+            <a:pPr algn="ctr"/>
+            <a:r>
+              <a:rPr kumimoji="1" lang="en-US" altLang="ko-Kore-KR" sz="2400" dirty="0" err="1">
+                <a:solidFill>
+                  <a:srgbClr val="FF0000"/>
+                </a:solidFill>
+              </a:rPr>
+              <a:t>WebConversionService</a:t>
+            </a:r>
+            <a:endParaRPr kumimoji="1" lang="ko-Kore-KR" altLang="en-US" sz="2400" dirty="0">
+              <a:solidFill>
+                <a:srgbClr val="FF0000"/>
+              </a:solidFill>
+            </a:endParaRPr>
+          </a:p>
+        </p:txBody>
+      </p:sp>
+      <p:cxnSp>
+        <p:nvCxnSpPr>
+          <p:cNvPr id="8" name="직선 화살표 연결선 7">
+            <a:extLst>
+              <a:ext uri="{FF2B5EF4-FFF2-40B4-BE49-F238E27FC236}">
+                <a16:creationId xmlns:a16="http://schemas.microsoft.com/office/drawing/2014/main" id="{1860C994-7D7C-0C4C-A8CE-4286F1807CC9}"/>
+              </a:ext>
+            </a:extLst>
+          </p:cNvPr>
+          <p:cNvCxnSpPr>
+            <a:stCxn id="4" idx="0"/>
+            <a:endCxn id="3" idx="2"/>
+          </p:cNvCxnSpPr>
+          <p:nvPr/>
+        </p:nvCxnSpPr>
+        <p:spPr>
+          <a:xfrm flipV="1">
+            <a:off x="6518868" y="2113005"/>
+            <a:ext cx="5193" cy="716692"/>
+          </a:xfrm>
+          <a:prstGeom prst="straightConnector1">
+            <a:avLst/>
+          </a:prstGeom>
+          <a:ln>
+            <a:tailEnd type="triangle"/>
+          </a:ln>
+        </p:spPr>
+        <p:style>
+          <a:lnRef idx="1">
+            <a:schemeClr val="accent1"/>
+          </a:lnRef>
+          <a:fillRef idx="0">
+            <a:schemeClr val="accent1"/>
+          </a:fillRef>
+          <a:effectRef idx="0">
+            <a:schemeClr val="accent1"/>
+          </a:effectRef>
+          <a:fontRef idx="minor">
+            <a:schemeClr val="tx1"/>
+          </a:fontRef>
+        </p:style>
+      </p:cxnSp>
+      <p:cxnSp>
+        <p:nvCxnSpPr>
+          <p:cNvPr id="9" name="직선 화살표 연결선 8">
+            <a:extLst>
+              <a:ext uri="{FF2B5EF4-FFF2-40B4-BE49-F238E27FC236}">
+                <a16:creationId xmlns:a16="http://schemas.microsoft.com/office/drawing/2014/main" id="{01330319-2B24-E742-AA91-B18C6D3C80B9}"/>
+              </a:ext>
+            </a:extLst>
+          </p:cNvPr>
+          <p:cNvCxnSpPr>
+            <a:cxnSpLocks/>
+            <a:stCxn id="5" idx="0"/>
+            <a:endCxn id="2" idx="2"/>
+          </p:cNvCxnSpPr>
+          <p:nvPr/>
+        </p:nvCxnSpPr>
+        <p:spPr>
+          <a:xfrm flipH="1" flipV="1">
+            <a:off x="3332373" y="3476028"/>
+            <a:ext cx="1683551" cy="731956"/>
+          </a:xfrm>
+          <a:prstGeom prst="straightConnector1">
+            <a:avLst/>
+          </a:prstGeom>
+          <a:ln>
+            <a:tailEnd type="triangle"/>
+          </a:ln>
+        </p:spPr>
+        <p:style>
+          <a:lnRef idx="1">
+            <a:schemeClr val="accent1"/>
+          </a:lnRef>
+          <a:fillRef idx="0">
+            <a:schemeClr val="accent1"/>
+          </a:fillRef>
+          <a:effectRef idx="0">
+            <a:schemeClr val="accent1"/>
+          </a:effectRef>
+          <a:fontRef idx="minor">
+            <a:schemeClr val="tx1"/>
+          </a:fontRef>
+        </p:style>
+      </p:cxnSp>
+      <p:cxnSp>
+        <p:nvCxnSpPr>
+          <p:cNvPr id="12" name="직선 화살표 연결선 11">
+            <a:extLst>
+              <a:ext uri="{FF2B5EF4-FFF2-40B4-BE49-F238E27FC236}">
+                <a16:creationId xmlns:a16="http://schemas.microsoft.com/office/drawing/2014/main" id="{A177D0E1-E606-CC44-B4DC-07681439C58C}"/>
+              </a:ext>
+            </a:extLst>
+          </p:cNvPr>
+          <p:cNvCxnSpPr>
+            <a:cxnSpLocks/>
+            <a:stCxn id="5" idx="0"/>
+            <a:endCxn id="4" idx="2"/>
+          </p:cNvCxnSpPr>
+          <p:nvPr/>
+        </p:nvCxnSpPr>
+        <p:spPr>
+          <a:xfrm flipV="1">
+            <a:off x="5015924" y="3476028"/>
+            <a:ext cx="1502944" cy="731956"/>
+          </a:xfrm>
+          <a:prstGeom prst="straightConnector1">
+            <a:avLst/>
+          </a:prstGeom>
+          <a:ln>
+            <a:tailEnd type="triangle"/>
+          </a:ln>
+        </p:spPr>
+        <p:style>
+          <a:lnRef idx="1">
+            <a:schemeClr val="accent1"/>
+          </a:lnRef>
+          <a:fillRef idx="0">
+            <a:schemeClr val="accent1"/>
+          </a:fillRef>
+          <a:effectRef idx="0">
+            <a:schemeClr val="accent1"/>
+          </a:effectRef>
+          <a:fontRef idx="minor">
+            <a:schemeClr val="tx1"/>
+          </a:fontRef>
+        </p:style>
+      </p:cxnSp>
+      <p:cxnSp>
+        <p:nvCxnSpPr>
+          <p:cNvPr id="15" name="직선 화살표 연결선 14">
+            <a:extLst>
+              <a:ext uri="{FF2B5EF4-FFF2-40B4-BE49-F238E27FC236}">
+                <a16:creationId xmlns:a16="http://schemas.microsoft.com/office/drawing/2014/main" id="{114E6FF3-D384-D048-84E7-29B1F8444123}"/>
+              </a:ext>
+            </a:extLst>
+          </p:cNvPr>
+          <p:cNvCxnSpPr>
+            <a:cxnSpLocks/>
+            <a:stCxn id="6" idx="0"/>
+            <a:endCxn id="5" idx="2"/>
+          </p:cNvCxnSpPr>
+          <p:nvPr/>
+        </p:nvCxnSpPr>
+        <p:spPr>
+          <a:xfrm flipH="1" flipV="1">
+            <a:off x="5015924" y="4854315"/>
+            <a:ext cx="10587" cy="731956"/>
+          </a:xfrm>
+          <a:prstGeom prst="straightConnector1">
+            <a:avLst/>
+          </a:prstGeom>
+          <a:ln>
+            <a:tailEnd type="triangle"/>
+          </a:ln>
+        </p:spPr>
+        <p:style>
+          <a:lnRef idx="1">
+            <a:schemeClr val="accent1"/>
+          </a:lnRef>
+          <a:fillRef idx="0">
+            <a:schemeClr val="accent1"/>
+          </a:fillRef>
+          <a:effectRef idx="0">
+            <a:schemeClr val="accent1"/>
+          </a:effectRef>
+          <a:fontRef idx="minor">
+            <a:schemeClr val="tx1"/>
+          </a:fontRef>
+        </p:style>
+      </p:cxnSp>
     </p:spTree>
     <p:extLst>
       <p:ext uri="{BB962C8B-B14F-4D97-AF65-F5344CB8AC3E}">

</xml_diff>

<commit_message>
Update | AspectJ details
</commit_message>
<xml_diff>
--- a/02-스프링 프레임워크 핵심 기술/assets/image.pptx
+++ b/02-스프링 프레임워크 핵심 기술/assets/image.pptx
@@ -4,6 +4,9 @@
   <p:sldMasterIdLst>
     <p:sldMasterId id="2147483648" r:id="rId1"/>
   </p:sldMasterIdLst>
+  <p:notesMasterIdLst>
+    <p:notesMasterId r:id="rId12"/>
+  </p:notesMasterIdLst>
   <p:sldIdLst>
     <p:sldId id="256" r:id="rId2"/>
     <p:sldId id="257" r:id="rId3"/>
@@ -11,7 +14,10 @@
     <p:sldId id="259" r:id="rId5"/>
     <p:sldId id="260" r:id="rId6"/>
     <p:sldId id="261" r:id="rId7"/>
-    <p:sldId id="262" r:id="rId8"/>
+    <p:sldId id="263" r:id="rId8"/>
+    <p:sldId id="264" r:id="rId9"/>
+    <p:sldId id="265" r:id="rId10"/>
+    <p:sldId id="262" r:id="rId11"/>
   </p:sldIdLst>
   <p:sldSz cx="12192000" cy="6858000"/>
   <p:notesSz cx="6858000" cy="9144000"/>
@@ -118,6 +124,440 @@
 </p:presentation>
 </file>
 
+<file path=ppt/notesMasters/notesMaster1.xml><?xml version="1.0" encoding="utf-8"?>
+<p:notesMaster xmlns:a="http://schemas.openxmlformats.org/drawingml/2006/main" xmlns:r="http://schemas.openxmlformats.org/officeDocument/2006/relationships" xmlns:p="http://schemas.openxmlformats.org/presentationml/2006/main">
+  <p:cSld>
+    <p:bg>
+      <p:bgRef idx="1001">
+        <a:schemeClr val="bg1"/>
+      </p:bgRef>
+    </p:bg>
+    <p:spTree>
+      <p:nvGrpSpPr>
+        <p:cNvPr id="1" name=""/>
+        <p:cNvGrpSpPr/>
+        <p:nvPr/>
+      </p:nvGrpSpPr>
+      <p:grpSpPr>
+        <a:xfrm>
+          <a:off x="0" y="0"/>
+          <a:ext cx="0" cy="0"/>
+          <a:chOff x="0" y="0"/>
+          <a:chExt cx="0" cy="0"/>
+        </a:xfrm>
+      </p:grpSpPr>
+      <p:sp>
+        <p:nvSpPr>
+          <p:cNvPr id="2" name="머리글 개체 틀 1"/>
+          <p:cNvSpPr>
+            <a:spLocks noGrp="1"/>
+          </p:cNvSpPr>
+          <p:nvPr>
+            <p:ph type="hdr" sz="quarter"/>
+          </p:nvPr>
+        </p:nvSpPr>
+        <p:spPr>
+          <a:xfrm>
+            <a:off x="0" y="0"/>
+            <a:ext cx="2971800" cy="458788"/>
+          </a:xfrm>
+          <a:prstGeom prst="rect">
+            <a:avLst/>
+          </a:prstGeom>
+        </p:spPr>
+        <p:txBody>
+          <a:bodyPr vert="horz" lIns="91440" tIns="45720" rIns="91440" bIns="45720" rtlCol="0"/>
+          <a:lstStyle>
+            <a:lvl1pPr algn="l">
+              <a:defRPr sz="1200"/>
+            </a:lvl1pPr>
+          </a:lstStyle>
+          <a:p>
+            <a:endParaRPr kumimoji="1" lang="ko-Kore-KR" altLang="en-US"/>
+          </a:p>
+        </p:txBody>
+      </p:sp>
+      <p:sp>
+        <p:nvSpPr>
+          <p:cNvPr id="3" name="날짜 개체 틀 2"/>
+          <p:cNvSpPr>
+            <a:spLocks noGrp="1"/>
+          </p:cNvSpPr>
+          <p:nvPr>
+            <p:ph type="dt" idx="1"/>
+          </p:nvPr>
+        </p:nvSpPr>
+        <p:spPr>
+          <a:xfrm>
+            <a:off x="3884613" y="0"/>
+            <a:ext cx="2971800" cy="458788"/>
+          </a:xfrm>
+          <a:prstGeom prst="rect">
+            <a:avLst/>
+          </a:prstGeom>
+        </p:spPr>
+        <p:txBody>
+          <a:bodyPr vert="horz" lIns="91440" tIns="45720" rIns="91440" bIns="45720" rtlCol="0"/>
+          <a:lstStyle>
+            <a:lvl1pPr algn="r">
+              <a:defRPr sz="1200"/>
+            </a:lvl1pPr>
+          </a:lstStyle>
+          <a:p>
+            <a:fld id="{3BC39B1C-0C05-494F-8C28-819A2C914565}" type="datetimeFigureOut">
+              <a:rPr kumimoji="1" lang="ko-Kore-KR" altLang="en-US" smtClean="0"/>
+              <a:t>2021. 5. 23.</a:t>
+            </a:fld>
+            <a:endParaRPr kumimoji="1" lang="ko-Kore-KR" altLang="en-US"/>
+          </a:p>
+        </p:txBody>
+      </p:sp>
+      <p:sp>
+        <p:nvSpPr>
+          <p:cNvPr id="4" name="슬라이드 이미지 개체 틀 3"/>
+          <p:cNvSpPr>
+            <a:spLocks noGrp="1" noRot="1" noChangeAspect="1"/>
+          </p:cNvSpPr>
+          <p:nvPr>
+            <p:ph type="sldImg" idx="2"/>
+          </p:nvPr>
+        </p:nvSpPr>
+        <p:spPr>
+          <a:xfrm>
+            <a:off x="685800" y="1143000"/>
+            <a:ext cx="5486400" cy="3086100"/>
+          </a:xfrm>
+          <a:prstGeom prst="rect">
+            <a:avLst/>
+          </a:prstGeom>
+          <a:noFill/>
+          <a:ln w="12700">
+            <a:solidFill>
+              <a:prstClr val="black"/>
+            </a:solidFill>
+          </a:ln>
+        </p:spPr>
+        <p:txBody>
+          <a:bodyPr vert="horz" lIns="91440" tIns="45720" rIns="91440" bIns="45720" rtlCol="0" anchor="ctr"/>
+          <a:lstStyle/>
+          <a:p>
+            <a:endParaRPr lang="ko-Kore-KR" altLang="en-US"/>
+          </a:p>
+        </p:txBody>
+      </p:sp>
+      <p:sp>
+        <p:nvSpPr>
+          <p:cNvPr id="5" name="슬라이드 노트 개체 틀 4"/>
+          <p:cNvSpPr>
+            <a:spLocks noGrp="1"/>
+          </p:cNvSpPr>
+          <p:nvPr>
+            <p:ph type="body" sz="quarter" idx="3"/>
+          </p:nvPr>
+        </p:nvSpPr>
+        <p:spPr>
+          <a:xfrm>
+            <a:off x="685800" y="4400550"/>
+            <a:ext cx="5486400" cy="3600450"/>
+          </a:xfrm>
+          <a:prstGeom prst="rect">
+            <a:avLst/>
+          </a:prstGeom>
+        </p:spPr>
+        <p:txBody>
+          <a:bodyPr vert="horz" lIns="91440" tIns="45720" rIns="91440" bIns="45720" rtlCol="0"/>
+          <a:lstStyle/>
+          <a:p>
+            <a:pPr lvl="0"/>
+            <a:r>
+              <a:rPr kumimoji="1" lang="ko-KR" altLang="en-US"/>
+              <a:t>마스터 텍스트 스타일을 편집하려면 클릭</a:t>
+            </a:r>
+          </a:p>
+          <a:p>
+            <a:pPr lvl="1"/>
+            <a:r>
+              <a:rPr kumimoji="1" lang="ko-KR" altLang="en-US"/>
+              <a:t>두 번째 수준</a:t>
+            </a:r>
+          </a:p>
+          <a:p>
+            <a:pPr lvl="2"/>
+            <a:r>
+              <a:rPr kumimoji="1" lang="ko-KR" altLang="en-US"/>
+              <a:t>세 번째 수준</a:t>
+            </a:r>
+          </a:p>
+          <a:p>
+            <a:pPr lvl="3"/>
+            <a:r>
+              <a:rPr kumimoji="1" lang="ko-KR" altLang="en-US"/>
+              <a:t>네 번째 수준</a:t>
+            </a:r>
+          </a:p>
+          <a:p>
+            <a:pPr lvl="4"/>
+            <a:r>
+              <a:rPr kumimoji="1" lang="ko-KR" altLang="en-US"/>
+              <a:t>다섯 번째 수준</a:t>
+            </a:r>
+            <a:endParaRPr kumimoji="1" lang="ko-Kore-KR" altLang="en-US"/>
+          </a:p>
+        </p:txBody>
+      </p:sp>
+      <p:sp>
+        <p:nvSpPr>
+          <p:cNvPr id="6" name="바닥글 개체 틀 5"/>
+          <p:cNvSpPr>
+            <a:spLocks noGrp="1"/>
+          </p:cNvSpPr>
+          <p:nvPr>
+            <p:ph type="ftr" sz="quarter" idx="4"/>
+          </p:nvPr>
+        </p:nvSpPr>
+        <p:spPr>
+          <a:xfrm>
+            <a:off x="0" y="8685213"/>
+            <a:ext cx="2971800" cy="458787"/>
+          </a:xfrm>
+          <a:prstGeom prst="rect">
+            <a:avLst/>
+          </a:prstGeom>
+        </p:spPr>
+        <p:txBody>
+          <a:bodyPr vert="horz" lIns="91440" tIns="45720" rIns="91440" bIns="45720" rtlCol="0" anchor="b"/>
+          <a:lstStyle>
+            <a:lvl1pPr algn="l">
+              <a:defRPr sz="1200"/>
+            </a:lvl1pPr>
+          </a:lstStyle>
+          <a:p>
+            <a:endParaRPr kumimoji="1" lang="ko-Kore-KR" altLang="en-US"/>
+          </a:p>
+        </p:txBody>
+      </p:sp>
+      <p:sp>
+        <p:nvSpPr>
+          <p:cNvPr id="7" name="슬라이드 번호 개체 틀 6"/>
+          <p:cNvSpPr>
+            <a:spLocks noGrp="1"/>
+          </p:cNvSpPr>
+          <p:nvPr>
+            <p:ph type="sldNum" sz="quarter" idx="5"/>
+          </p:nvPr>
+        </p:nvSpPr>
+        <p:spPr>
+          <a:xfrm>
+            <a:off x="3884613" y="8685213"/>
+            <a:ext cx="2971800" cy="458787"/>
+          </a:xfrm>
+          <a:prstGeom prst="rect">
+            <a:avLst/>
+          </a:prstGeom>
+        </p:spPr>
+        <p:txBody>
+          <a:bodyPr vert="horz" lIns="91440" tIns="45720" rIns="91440" bIns="45720" rtlCol="0" anchor="b"/>
+          <a:lstStyle>
+            <a:lvl1pPr algn="r">
+              <a:defRPr sz="1200"/>
+            </a:lvl1pPr>
+          </a:lstStyle>
+          <a:p>
+            <a:fld id="{88B4150C-7EC1-674A-BF29-56B2E1FB979E}" type="slidenum">
+              <a:rPr kumimoji="1" lang="ko-Kore-KR" altLang="en-US" smtClean="0"/>
+              <a:t>‹#›</a:t>
+            </a:fld>
+            <a:endParaRPr kumimoji="1" lang="ko-Kore-KR" altLang="en-US"/>
+          </a:p>
+        </p:txBody>
+      </p:sp>
+    </p:spTree>
+    <p:extLst>
+      <p:ext uri="{BB962C8B-B14F-4D97-AF65-F5344CB8AC3E}">
+        <p14:creationId xmlns:p14="http://schemas.microsoft.com/office/powerpoint/2010/main" val="1715401440"/>
+      </p:ext>
+    </p:extLst>
+  </p:cSld>
+  <p:clrMap bg1="lt1" tx1="dk1" bg2="lt2" tx2="dk2" accent1="accent1" accent2="accent2" accent3="accent3" accent4="accent4" accent5="accent5" accent6="accent6" hlink="hlink" folHlink="folHlink"/>
+  <p:notesStyle>
+    <a:lvl1pPr marL="0" algn="l" defTabSz="914400" rtl="0" eaLnBrk="1" latinLnBrk="0" hangingPunct="1">
+      <a:defRPr sz="1200" kern="1200">
+        <a:solidFill>
+          <a:schemeClr val="tx1"/>
+        </a:solidFill>
+        <a:latin typeface="+mn-lt"/>
+        <a:ea typeface="+mn-ea"/>
+        <a:cs typeface="+mn-cs"/>
+      </a:defRPr>
+    </a:lvl1pPr>
+    <a:lvl2pPr marL="457200" algn="l" defTabSz="914400" rtl="0" eaLnBrk="1" latinLnBrk="0" hangingPunct="1">
+      <a:defRPr sz="1200" kern="1200">
+        <a:solidFill>
+          <a:schemeClr val="tx1"/>
+        </a:solidFill>
+        <a:latin typeface="+mn-lt"/>
+        <a:ea typeface="+mn-ea"/>
+        <a:cs typeface="+mn-cs"/>
+      </a:defRPr>
+    </a:lvl2pPr>
+    <a:lvl3pPr marL="914400" algn="l" defTabSz="914400" rtl="0" eaLnBrk="1" latinLnBrk="0" hangingPunct="1">
+      <a:defRPr sz="1200" kern="1200">
+        <a:solidFill>
+          <a:schemeClr val="tx1"/>
+        </a:solidFill>
+        <a:latin typeface="+mn-lt"/>
+        <a:ea typeface="+mn-ea"/>
+        <a:cs typeface="+mn-cs"/>
+      </a:defRPr>
+    </a:lvl3pPr>
+    <a:lvl4pPr marL="1371600" algn="l" defTabSz="914400" rtl="0" eaLnBrk="1" latinLnBrk="0" hangingPunct="1">
+      <a:defRPr sz="1200" kern="1200">
+        <a:solidFill>
+          <a:schemeClr val="tx1"/>
+        </a:solidFill>
+        <a:latin typeface="+mn-lt"/>
+        <a:ea typeface="+mn-ea"/>
+        <a:cs typeface="+mn-cs"/>
+      </a:defRPr>
+    </a:lvl4pPr>
+    <a:lvl5pPr marL="1828800" algn="l" defTabSz="914400" rtl="0" eaLnBrk="1" latinLnBrk="0" hangingPunct="1">
+      <a:defRPr sz="1200" kern="1200">
+        <a:solidFill>
+          <a:schemeClr val="tx1"/>
+        </a:solidFill>
+        <a:latin typeface="+mn-lt"/>
+        <a:ea typeface="+mn-ea"/>
+        <a:cs typeface="+mn-cs"/>
+      </a:defRPr>
+    </a:lvl5pPr>
+    <a:lvl6pPr marL="2286000" algn="l" defTabSz="914400" rtl="0" eaLnBrk="1" latinLnBrk="0" hangingPunct="1">
+      <a:defRPr sz="1200" kern="1200">
+        <a:solidFill>
+          <a:schemeClr val="tx1"/>
+        </a:solidFill>
+        <a:latin typeface="+mn-lt"/>
+        <a:ea typeface="+mn-ea"/>
+        <a:cs typeface="+mn-cs"/>
+      </a:defRPr>
+    </a:lvl6pPr>
+    <a:lvl7pPr marL="2743200" algn="l" defTabSz="914400" rtl="0" eaLnBrk="1" latinLnBrk="0" hangingPunct="1">
+      <a:defRPr sz="1200" kern="1200">
+        <a:solidFill>
+          <a:schemeClr val="tx1"/>
+        </a:solidFill>
+        <a:latin typeface="+mn-lt"/>
+        <a:ea typeface="+mn-ea"/>
+        <a:cs typeface="+mn-cs"/>
+      </a:defRPr>
+    </a:lvl7pPr>
+    <a:lvl8pPr marL="3200400" algn="l" defTabSz="914400" rtl="0" eaLnBrk="1" latinLnBrk="0" hangingPunct="1">
+      <a:defRPr sz="1200" kern="1200">
+        <a:solidFill>
+          <a:schemeClr val="tx1"/>
+        </a:solidFill>
+        <a:latin typeface="+mn-lt"/>
+        <a:ea typeface="+mn-ea"/>
+        <a:cs typeface="+mn-cs"/>
+      </a:defRPr>
+    </a:lvl8pPr>
+    <a:lvl9pPr marL="3657600" algn="l" defTabSz="914400" rtl="0" eaLnBrk="1" latinLnBrk="0" hangingPunct="1">
+      <a:defRPr sz="1200" kern="1200">
+        <a:solidFill>
+          <a:schemeClr val="tx1"/>
+        </a:solidFill>
+        <a:latin typeface="+mn-lt"/>
+        <a:ea typeface="+mn-ea"/>
+        <a:cs typeface="+mn-cs"/>
+      </a:defRPr>
+    </a:lvl9pPr>
+  </p:notesStyle>
+</p:notesMaster>
+</file>
+
+<file path=ppt/notesSlides/notesSlide1.xml><?xml version="1.0" encoding="utf-8"?>
+<p:notes xmlns:a="http://schemas.openxmlformats.org/drawingml/2006/main" xmlns:r="http://schemas.openxmlformats.org/officeDocument/2006/relationships" xmlns:p="http://schemas.openxmlformats.org/presentationml/2006/main">
+  <p:cSld>
+    <p:spTree>
+      <p:nvGrpSpPr>
+        <p:cNvPr id="1" name=""/>
+        <p:cNvGrpSpPr/>
+        <p:nvPr/>
+      </p:nvGrpSpPr>
+      <p:grpSpPr>
+        <a:xfrm>
+          <a:off x="0" y="0"/>
+          <a:ext cx="0" cy="0"/>
+          <a:chOff x="0" y="0"/>
+          <a:chExt cx="0" cy="0"/>
+        </a:xfrm>
+      </p:grpSpPr>
+      <p:sp>
+        <p:nvSpPr>
+          <p:cNvPr id="2" name="슬라이드 이미지 개체 틀 1"/>
+          <p:cNvSpPr>
+            <a:spLocks noGrp="1" noRot="1" noChangeAspect="1"/>
+          </p:cNvSpPr>
+          <p:nvPr>
+            <p:ph type="sldImg"/>
+          </p:nvPr>
+        </p:nvSpPr>
+        <p:spPr/>
+      </p:sp>
+      <p:sp>
+        <p:nvSpPr>
+          <p:cNvPr id="3" name="슬라이드 노트 개체 틀 2"/>
+          <p:cNvSpPr>
+            <a:spLocks noGrp="1"/>
+          </p:cNvSpPr>
+          <p:nvPr>
+            <p:ph type="body" idx="1"/>
+          </p:nvPr>
+        </p:nvSpPr>
+        <p:spPr/>
+        <p:txBody>
+          <a:bodyPr/>
+          <a:lstStyle/>
+          <a:p>
+            <a:endParaRPr kumimoji="1" lang="ko-Kore-KR" altLang="en-US" dirty="0"/>
+          </a:p>
+        </p:txBody>
+      </p:sp>
+      <p:sp>
+        <p:nvSpPr>
+          <p:cNvPr id="4" name="슬라이드 번호 개체 틀 3"/>
+          <p:cNvSpPr>
+            <a:spLocks noGrp="1"/>
+          </p:cNvSpPr>
+          <p:nvPr>
+            <p:ph type="sldNum" sz="quarter" idx="5"/>
+          </p:nvPr>
+        </p:nvSpPr>
+        <p:spPr/>
+        <p:txBody>
+          <a:bodyPr/>
+          <a:lstStyle/>
+          <a:p>
+            <a:fld id="{88B4150C-7EC1-674A-BF29-56B2E1FB979E}" type="slidenum">
+              <a:rPr kumimoji="1" lang="ko-Kore-KR" altLang="en-US" smtClean="0"/>
+              <a:t>6</a:t>
+            </a:fld>
+            <a:endParaRPr kumimoji="1" lang="ko-Kore-KR" altLang="en-US"/>
+          </a:p>
+        </p:txBody>
+      </p:sp>
+    </p:spTree>
+    <p:extLst>
+      <p:ext uri="{BB962C8B-B14F-4D97-AF65-F5344CB8AC3E}">
+        <p14:creationId xmlns:p14="http://schemas.microsoft.com/office/powerpoint/2010/main" val="1919347213"/>
+      </p:ext>
+    </p:extLst>
+  </p:cSld>
+  <p:clrMapOvr>
+    <a:masterClrMapping/>
+  </p:clrMapOvr>
+</p:notes>
+</file>
+
 <file path=ppt/slideLayouts/slideLayout1.xml><?xml version="1.0" encoding="utf-8"?>
 <p:sldLayout xmlns:a="http://schemas.openxmlformats.org/drawingml/2006/main" xmlns:r="http://schemas.openxmlformats.org/officeDocument/2006/relationships" xmlns:p="http://schemas.openxmlformats.org/presentationml/2006/main" type="title" preserve="1">
   <p:cSld name="제목 슬라이드">
@@ -267,7 +707,7 @@
           <a:p>
             <a:fld id="{CD328C22-8105-EF4E-AA44-26483BF34525}" type="datetimeFigureOut">
               <a:rPr kumimoji="1" lang="ko-Kore-KR" altLang="en-US" smtClean="0"/>
-              <a:t>2021. 5. 19.</a:t>
+              <a:t>2021. 5. 23.</a:t>
             </a:fld>
             <a:endParaRPr kumimoji="1" lang="ko-Kore-KR" altLang="en-US"/>
           </a:p>
@@ -467,7 +907,7 @@
           <a:p>
             <a:fld id="{CD328C22-8105-EF4E-AA44-26483BF34525}" type="datetimeFigureOut">
               <a:rPr kumimoji="1" lang="ko-Kore-KR" altLang="en-US" smtClean="0"/>
-              <a:t>2021. 5. 19.</a:t>
+              <a:t>2021. 5. 23.</a:t>
             </a:fld>
             <a:endParaRPr kumimoji="1" lang="ko-Kore-KR" altLang="en-US"/>
           </a:p>
@@ -677,7 +1117,7 @@
           <a:p>
             <a:fld id="{CD328C22-8105-EF4E-AA44-26483BF34525}" type="datetimeFigureOut">
               <a:rPr kumimoji="1" lang="ko-Kore-KR" altLang="en-US" smtClean="0"/>
-              <a:t>2021. 5. 19.</a:t>
+              <a:t>2021. 5. 23.</a:t>
             </a:fld>
             <a:endParaRPr kumimoji="1" lang="ko-Kore-KR" altLang="en-US"/>
           </a:p>
@@ -877,7 +1317,7 @@
           <a:p>
             <a:fld id="{CD328C22-8105-EF4E-AA44-26483BF34525}" type="datetimeFigureOut">
               <a:rPr kumimoji="1" lang="ko-Kore-KR" altLang="en-US" smtClean="0"/>
-              <a:t>2021. 5. 19.</a:t>
+              <a:t>2021. 5. 23.</a:t>
             </a:fld>
             <a:endParaRPr kumimoji="1" lang="ko-Kore-KR" altLang="en-US"/>
           </a:p>
@@ -1153,7 +1593,7 @@
           <a:p>
             <a:fld id="{CD328C22-8105-EF4E-AA44-26483BF34525}" type="datetimeFigureOut">
               <a:rPr kumimoji="1" lang="ko-Kore-KR" altLang="en-US" smtClean="0"/>
-              <a:t>2021. 5. 19.</a:t>
+              <a:t>2021. 5. 23.</a:t>
             </a:fld>
             <a:endParaRPr kumimoji="1" lang="ko-Kore-KR" altLang="en-US"/>
           </a:p>
@@ -1421,7 +1861,7 @@
           <a:p>
             <a:fld id="{CD328C22-8105-EF4E-AA44-26483BF34525}" type="datetimeFigureOut">
               <a:rPr kumimoji="1" lang="ko-Kore-KR" altLang="en-US" smtClean="0"/>
-              <a:t>2021. 5. 19.</a:t>
+              <a:t>2021. 5. 23.</a:t>
             </a:fld>
             <a:endParaRPr kumimoji="1" lang="ko-Kore-KR" altLang="en-US"/>
           </a:p>
@@ -1836,7 +2276,7 @@
           <a:p>
             <a:fld id="{CD328C22-8105-EF4E-AA44-26483BF34525}" type="datetimeFigureOut">
               <a:rPr kumimoji="1" lang="ko-Kore-KR" altLang="en-US" smtClean="0"/>
-              <a:t>2021. 5. 19.</a:t>
+              <a:t>2021. 5. 23.</a:t>
             </a:fld>
             <a:endParaRPr kumimoji="1" lang="ko-Kore-KR" altLang="en-US"/>
           </a:p>
@@ -1978,7 +2418,7 @@
           <a:p>
             <a:fld id="{CD328C22-8105-EF4E-AA44-26483BF34525}" type="datetimeFigureOut">
               <a:rPr kumimoji="1" lang="ko-Kore-KR" altLang="en-US" smtClean="0"/>
-              <a:t>2021. 5. 19.</a:t>
+              <a:t>2021. 5. 23.</a:t>
             </a:fld>
             <a:endParaRPr kumimoji="1" lang="ko-Kore-KR" altLang="en-US"/>
           </a:p>
@@ -2091,7 +2531,7 @@
           <a:p>
             <a:fld id="{CD328C22-8105-EF4E-AA44-26483BF34525}" type="datetimeFigureOut">
               <a:rPr kumimoji="1" lang="ko-Kore-KR" altLang="en-US" smtClean="0"/>
-              <a:t>2021. 5. 19.</a:t>
+              <a:t>2021. 5. 23.</a:t>
             </a:fld>
             <a:endParaRPr kumimoji="1" lang="ko-Kore-KR" altLang="en-US"/>
           </a:p>
@@ -2404,7 +2844,7 @@
           <a:p>
             <a:fld id="{CD328C22-8105-EF4E-AA44-26483BF34525}" type="datetimeFigureOut">
               <a:rPr kumimoji="1" lang="ko-Kore-KR" altLang="en-US" smtClean="0"/>
-              <a:t>2021. 5. 19.</a:t>
+              <a:t>2021. 5. 23.</a:t>
             </a:fld>
             <a:endParaRPr kumimoji="1" lang="ko-Kore-KR" altLang="en-US"/>
           </a:p>
@@ -2693,7 +3133,7 @@
           <a:p>
             <a:fld id="{CD328C22-8105-EF4E-AA44-26483BF34525}" type="datetimeFigureOut">
               <a:rPr kumimoji="1" lang="ko-Kore-KR" altLang="en-US" smtClean="0"/>
-              <a:t>2021. 5. 19.</a:t>
+              <a:t>2021. 5. 23.</a:t>
             </a:fld>
             <a:endParaRPr kumimoji="1" lang="ko-Kore-KR" altLang="en-US"/>
           </a:p>
@@ -2936,7 +3376,7 @@
           <a:p>
             <a:fld id="{CD328C22-8105-EF4E-AA44-26483BF34525}" type="datetimeFigureOut">
               <a:rPr kumimoji="1" lang="ko-Kore-KR" altLang="en-US" smtClean="0"/>
-              <a:t>2021. 5. 19.</a:t>
+              <a:t>2021. 5. 23.</a:t>
             </a:fld>
             <a:endParaRPr kumimoji="1" lang="ko-Kore-KR" altLang="en-US"/>
           </a:p>
@@ -3396,6 +3836,462 @@
 </p:sld>
 </file>
 
+<file path=ppt/slides/slide10.xml><?xml version="1.0" encoding="utf-8"?>
+<p:sld xmlns:a="http://schemas.openxmlformats.org/drawingml/2006/main" xmlns:r="http://schemas.openxmlformats.org/officeDocument/2006/relationships" xmlns:p="http://schemas.openxmlformats.org/presentationml/2006/main">
+  <p:cSld>
+    <p:spTree>
+      <p:nvGrpSpPr>
+        <p:cNvPr id="1" name=""/>
+        <p:cNvGrpSpPr/>
+        <p:nvPr/>
+      </p:nvGrpSpPr>
+      <p:grpSpPr>
+        <a:xfrm>
+          <a:off x="0" y="0"/>
+          <a:ext cx="0" cy="0"/>
+          <a:chOff x="0" y="0"/>
+          <a:chExt cx="0" cy="0"/>
+        </a:xfrm>
+      </p:grpSpPr>
+      <p:sp>
+        <p:nvSpPr>
+          <p:cNvPr id="2" name="TextBox 1">
+            <a:extLst>
+              <a:ext uri="{FF2B5EF4-FFF2-40B4-BE49-F238E27FC236}">
+                <a16:creationId xmlns:a16="http://schemas.microsoft.com/office/drawing/2014/main" id="{95D8167B-BF61-7341-9BB4-3E7A7248748C}"/>
+              </a:ext>
+            </a:extLst>
+          </p:cNvPr>
+          <p:cNvSpPr txBox="1"/>
+          <p:nvPr/>
+        </p:nvSpPr>
+        <p:spPr>
+          <a:xfrm>
+            <a:off x="2718487" y="2829697"/>
+            <a:ext cx="1227772" cy="646331"/>
+          </a:xfrm>
+          <a:prstGeom prst="rect">
+            <a:avLst/>
+          </a:prstGeom>
+          <a:noFill/>
+          <a:ln>
+            <a:solidFill>
+              <a:schemeClr val="bg2">
+                <a:lumMod val="75000"/>
+              </a:schemeClr>
+            </a:solidFill>
+          </a:ln>
+        </p:spPr>
+        <p:txBody>
+          <a:bodyPr wrap="none" rtlCol="0">
+            <a:spAutoFit/>
+          </a:bodyPr>
+          <a:lstStyle/>
+          <a:p>
+            <a:pPr algn="ctr"/>
+            <a:r>
+              <a:rPr kumimoji="1" lang="en-US" altLang="ko-Kore-KR" dirty="0"/>
+              <a:t>Conversion</a:t>
+            </a:r>
+          </a:p>
+          <a:p>
+            <a:pPr algn="ctr"/>
+            <a:r>
+              <a:rPr kumimoji="1" lang="en-US" altLang="ko-Kore-KR" dirty="0"/>
+              <a:t>Service</a:t>
+            </a:r>
+            <a:endParaRPr kumimoji="1" lang="ko-Kore-KR" altLang="en-US" dirty="0"/>
+          </a:p>
+        </p:txBody>
+      </p:sp>
+      <p:sp>
+        <p:nvSpPr>
+          <p:cNvPr id="3" name="TextBox 2">
+            <a:extLst>
+              <a:ext uri="{FF2B5EF4-FFF2-40B4-BE49-F238E27FC236}">
+                <a16:creationId xmlns:a16="http://schemas.microsoft.com/office/drawing/2014/main" id="{36AB6AFB-FC0F-CC4A-A2DA-996A45B0836E}"/>
+              </a:ext>
+            </a:extLst>
+          </p:cNvPr>
+          <p:cNvSpPr txBox="1"/>
+          <p:nvPr/>
+        </p:nvSpPr>
+        <p:spPr>
+          <a:xfrm>
+            <a:off x="5966344" y="1466674"/>
+            <a:ext cx="1115434" cy="646331"/>
+          </a:xfrm>
+          <a:prstGeom prst="rect">
+            <a:avLst/>
+          </a:prstGeom>
+          <a:noFill/>
+          <a:ln>
+            <a:solidFill>
+              <a:schemeClr val="bg2">
+                <a:lumMod val="75000"/>
+              </a:schemeClr>
+            </a:solidFill>
+          </a:ln>
+        </p:spPr>
+        <p:txBody>
+          <a:bodyPr wrap="none" rtlCol="0">
+            <a:spAutoFit/>
+          </a:bodyPr>
+          <a:lstStyle/>
+          <a:p>
+            <a:pPr algn="ctr"/>
+            <a:r>
+              <a:rPr kumimoji="1" lang="en-US" altLang="ko-Kore-KR" dirty="0"/>
+              <a:t>Converter</a:t>
+            </a:r>
+          </a:p>
+          <a:p>
+            <a:pPr algn="ctr"/>
+            <a:r>
+              <a:rPr kumimoji="1" lang="en-US" altLang="ko-Kore-KR" dirty="0"/>
+              <a:t>Registry</a:t>
+            </a:r>
+          </a:p>
+        </p:txBody>
+      </p:sp>
+      <p:sp>
+        <p:nvSpPr>
+          <p:cNvPr id="4" name="TextBox 3">
+            <a:extLst>
+              <a:ext uri="{FF2B5EF4-FFF2-40B4-BE49-F238E27FC236}">
+                <a16:creationId xmlns:a16="http://schemas.microsoft.com/office/drawing/2014/main" id="{E5104C7B-FB03-4F40-9D6C-69B3F56C09C0}"/>
+              </a:ext>
+            </a:extLst>
+          </p:cNvPr>
+          <p:cNvSpPr txBox="1"/>
+          <p:nvPr/>
+        </p:nvSpPr>
+        <p:spPr>
+          <a:xfrm>
+            <a:off x="5955957" y="2829697"/>
+            <a:ext cx="1125821" cy="646331"/>
+          </a:xfrm>
+          <a:prstGeom prst="rect">
+            <a:avLst/>
+          </a:prstGeom>
+          <a:noFill/>
+          <a:ln>
+            <a:solidFill>
+              <a:schemeClr val="bg2">
+                <a:lumMod val="75000"/>
+              </a:schemeClr>
+            </a:solidFill>
+          </a:ln>
+        </p:spPr>
+        <p:txBody>
+          <a:bodyPr wrap="none" rtlCol="0">
+            <a:spAutoFit/>
+          </a:bodyPr>
+          <a:lstStyle/>
+          <a:p>
+            <a:pPr algn="ctr"/>
+            <a:r>
+              <a:rPr kumimoji="1" lang="en-US" altLang="ko-Kore-KR" dirty="0"/>
+              <a:t>Formatter</a:t>
+            </a:r>
+          </a:p>
+          <a:p>
+            <a:pPr algn="ctr"/>
+            <a:r>
+              <a:rPr kumimoji="1" lang="en-US" altLang="ko-Kore-KR" dirty="0"/>
+              <a:t>Registry</a:t>
+            </a:r>
+          </a:p>
+        </p:txBody>
+      </p:sp>
+      <p:sp>
+        <p:nvSpPr>
+          <p:cNvPr id="5" name="TextBox 4">
+            <a:extLst>
+              <a:ext uri="{FF2B5EF4-FFF2-40B4-BE49-F238E27FC236}">
+                <a16:creationId xmlns:a16="http://schemas.microsoft.com/office/drawing/2014/main" id="{B076E696-6C39-7A41-B171-0B677FC86E9C}"/>
+              </a:ext>
+            </a:extLst>
+          </p:cNvPr>
+          <p:cNvSpPr txBox="1"/>
+          <p:nvPr/>
+        </p:nvSpPr>
+        <p:spPr>
+          <a:xfrm>
+            <a:off x="4065503" y="4207984"/>
+            <a:ext cx="1900841" cy="646331"/>
+          </a:xfrm>
+          <a:prstGeom prst="rect">
+            <a:avLst/>
+          </a:prstGeom>
+          <a:noFill/>
+          <a:ln>
+            <a:solidFill>
+              <a:schemeClr val="bg2">
+                <a:lumMod val="75000"/>
+              </a:schemeClr>
+            </a:solidFill>
+          </a:ln>
+        </p:spPr>
+        <p:txBody>
+          <a:bodyPr wrap="none" rtlCol="0">
+            <a:spAutoFit/>
+          </a:bodyPr>
+          <a:lstStyle/>
+          <a:p>
+            <a:pPr algn="ctr"/>
+            <a:r>
+              <a:rPr kumimoji="1" lang="en-US" altLang="ko-Kore-KR" dirty="0" err="1"/>
+              <a:t>DefaultFormatting</a:t>
+            </a:r>
+            <a:endParaRPr kumimoji="1" lang="en-US" altLang="ko-Kore-KR" dirty="0"/>
+          </a:p>
+          <a:p>
+            <a:pPr algn="ctr"/>
+            <a:r>
+              <a:rPr kumimoji="1" lang="en-US" altLang="ko-Kore-KR" dirty="0" err="1"/>
+              <a:t>ConversionService</a:t>
+            </a:r>
+            <a:endParaRPr kumimoji="1" lang="ko-Kore-KR" altLang="en-US" dirty="0"/>
+          </a:p>
+        </p:txBody>
+      </p:sp>
+      <p:sp>
+        <p:nvSpPr>
+          <p:cNvPr id="6" name="TextBox 5">
+            <a:extLst>
+              <a:ext uri="{FF2B5EF4-FFF2-40B4-BE49-F238E27FC236}">
+                <a16:creationId xmlns:a16="http://schemas.microsoft.com/office/drawing/2014/main" id="{80DED452-3663-6141-BBFC-7DE813DBC312}"/>
+              </a:ext>
+            </a:extLst>
+          </p:cNvPr>
+          <p:cNvSpPr txBox="1"/>
+          <p:nvPr/>
+        </p:nvSpPr>
+        <p:spPr>
+          <a:xfrm>
+            <a:off x="3506009" y="5586271"/>
+            <a:ext cx="3041004" cy="461665"/>
+          </a:xfrm>
+          <a:prstGeom prst="rect">
+            <a:avLst/>
+          </a:prstGeom>
+          <a:noFill/>
+          <a:ln>
+            <a:solidFill>
+              <a:schemeClr val="bg2">
+                <a:lumMod val="75000"/>
+              </a:schemeClr>
+            </a:solidFill>
+          </a:ln>
+        </p:spPr>
+        <p:txBody>
+          <a:bodyPr wrap="square" rtlCol="0">
+            <a:spAutoFit/>
+          </a:bodyPr>
+          <a:lstStyle/>
+          <a:p>
+            <a:pPr algn="ctr"/>
+            <a:r>
+              <a:rPr kumimoji="1" lang="en-US" altLang="ko-Kore-KR" sz="2400" dirty="0" err="1">
+                <a:solidFill>
+                  <a:srgbClr val="FF0000"/>
+                </a:solidFill>
+              </a:rPr>
+              <a:t>WebConversionService</a:t>
+            </a:r>
+            <a:endParaRPr kumimoji="1" lang="ko-Kore-KR" altLang="en-US" sz="2400" dirty="0">
+              <a:solidFill>
+                <a:srgbClr val="FF0000"/>
+              </a:solidFill>
+            </a:endParaRPr>
+          </a:p>
+        </p:txBody>
+      </p:sp>
+      <p:cxnSp>
+        <p:nvCxnSpPr>
+          <p:cNvPr id="8" name="직선 화살표 연결선 7">
+            <a:extLst>
+              <a:ext uri="{FF2B5EF4-FFF2-40B4-BE49-F238E27FC236}">
+                <a16:creationId xmlns:a16="http://schemas.microsoft.com/office/drawing/2014/main" id="{1860C994-7D7C-0C4C-A8CE-4286F1807CC9}"/>
+              </a:ext>
+            </a:extLst>
+          </p:cNvPr>
+          <p:cNvCxnSpPr>
+            <a:stCxn id="4" idx="0"/>
+            <a:endCxn id="3" idx="2"/>
+          </p:cNvCxnSpPr>
+          <p:nvPr/>
+        </p:nvCxnSpPr>
+        <p:spPr>
+          <a:xfrm flipV="1">
+            <a:off x="6518868" y="2113005"/>
+            <a:ext cx="5193" cy="716692"/>
+          </a:xfrm>
+          <a:prstGeom prst="straightConnector1">
+            <a:avLst/>
+          </a:prstGeom>
+          <a:ln>
+            <a:tailEnd type="triangle"/>
+          </a:ln>
+        </p:spPr>
+        <p:style>
+          <a:lnRef idx="1">
+            <a:schemeClr val="accent1"/>
+          </a:lnRef>
+          <a:fillRef idx="0">
+            <a:schemeClr val="accent1"/>
+          </a:fillRef>
+          <a:effectRef idx="0">
+            <a:schemeClr val="accent1"/>
+          </a:effectRef>
+          <a:fontRef idx="minor">
+            <a:schemeClr val="tx1"/>
+          </a:fontRef>
+        </p:style>
+      </p:cxnSp>
+      <p:cxnSp>
+        <p:nvCxnSpPr>
+          <p:cNvPr id="9" name="직선 화살표 연결선 8">
+            <a:extLst>
+              <a:ext uri="{FF2B5EF4-FFF2-40B4-BE49-F238E27FC236}">
+                <a16:creationId xmlns:a16="http://schemas.microsoft.com/office/drawing/2014/main" id="{01330319-2B24-E742-AA91-B18C6D3C80B9}"/>
+              </a:ext>
+            </a:extLst>
+          </p:cNvPr>
+          <p:cNvCxnSpPr>
+            <a:cxnSpLocks/>
+            <a:stCxn id="5" idx="0"/>
+            <a:endCxn id="2" idx="2"/>
+          </p:cNvCxnSpPr>
+          <p:nvPr/>
+        </p:nvCxnSpPr>
+        <p:spPr>
+          <a:xfrm flipH="1" flipV="1">
+            <a:off x="3332373" y="3476028"/>
+            <a:ext cx="1683551" cy="731956"/>
+          </a:xfrm>
+          <a:prstGeom prst="straightConnector1">
+            <a:avLst/>
+          </a:prstGeom>
+          <a:ln>
+            <a:tailEnd type="triangle"/>
+          </a:ln>
+        </p:spPr>
+        <p:style>
+          <a:lnRef idx="1">
+            <a:schemeClr val="accent1"/>
+          </a:lnRef>
+          <a:fillRef idx="0">
+            <a:schemeClr val="accent1"/>
+          </a:fillRef>
+          <a:effectRef idx="0">
+            <a:schemeClr val="accent1"/>
+          </a:effectRef>
+          <a:fontRef idx="minor">
+            <a:schemeClr val="tx1"/>
+          </a:fontRef>
+        </p:style>
+      </p:cxnSp>
+      <p:cxnSp>
+        <p:nvCxnSpPr>
+          <p:cNvPr id="12" name="직선 화살표 연결선 11">
+            <a:extLst>
+              <a:ext uri="{FF2B5EF4-FFF2-40B4-BE49-F238E27FC236}">
+                <a16:creationId xmlns:a16="http://schemas.microsoft.com/office/drawing/2014/main" id="{A177D0E1-E606-CC44-B4DC-07681439C58C}"/>
+              </a:ext>
+            </a:extLst>
+          </p:cNvPr>
+          <p:cNvCxnSpPr>
+            <a:cxnSpLocks/>
+            <a:stCxn id="5" idx="0"/>
+            <a:endCxn id="4" idx="2"/>
+          </p:cNvCxnSpPr>
+          <p:nvPr/>
+        </p:nvCxnSpPr>
+        <p:spPr>
+          <a:xfrm flipV="1">
+            <a:off x="5015924" y="3476028"/>
+            <a:ext cx="1502944" cy="731956"/>
+          </a:xfrm>
+          <a:prstGeom prst="straightConnector1">
+            <a:avLst/>
+          </a:prstGeom>
+          <a:ln>
+            <a:tailEnd type="triangle"/>
+          </a:ln>
+        </p:spPr>
+        <p:style>
+          <a:lnRef idx="1">
+            <a:schemeClr val="accent1"/>
+          </a:lnRef>
+          <a:fillRef idx="0">
+            <a:schemeClr val="accent1"/>
+          </a:fillRef>
+          <a:effectRef idx="0">
+            <a:schemeClr val="accent1"/>
+          </a:effectRef>
+          <a:fontRef idx="minor">
+            <a:schemeClr val="tx1"/>
+          </a:fontRef>
+        </p:style>
+      </p:cxnSp>
+      <p:cxnSp>
+        <p:nvCxnSpPr>
+          <p:cNvPr id="15" name="직선 화살표 연결선 14">
+            <a:extLst>
+              <a:ext uri="{FF2B5EF4-FFF2-40B4-BE49-F238E27FC236}">
+                <a16:creationId xmlns:a16="http://schemas.microsoft.com/office/drawing/2014/main" id="{114E6FF3-D384-D048-84E7-29B1F8444123}"/>
+              </a:ext>
+            </a:extLst>
+          </p:cNvPr>
+          <p:cNvCxnSpPr>
+            <a:cxnSpLocks/>
+            <a:stCxn id="6" idx="0"/>
+            <a:endCxn id="5" idx="2"/>
+          </p:cNvCxnSpPr>
+          <p:nvPr/>
+        </p:nvCxnSpPr>
+        <p:spPr>
+          <a:xfrm flipH="1" flipV="1">
+            <a:off x="5015924" y="4854315"/>
+            <a:ext cx="10587" cy="731956"/>
+          </a:xfrm>
+          <a:prstGeom prst="straightConnector1">
+            <a:avLst/>
+          </a:prstGeom>
+          <a:ln>
+            <a:tailEnd type="triangle"/>
+          </a:ln>
+        </p:spPr>
+        <p:style>
+          <a:lnRef idx="1">
+            <a:schemeClr val="accent1"/>
+          </a:lnRef>
+          <a:fillRef idx="0">
+            <a:schemeClr val="accent1"/>
+          </a:fillRef>
+          <a:effectRef idx="0">
+            <a:schemeClr val="accent1"/>
+          </a:effectRef>
+          <a:fontRef idx="minor">
+            <a:schemeClr val="tx1"/>
+          </a:fontRef>
+        </p:style>
+      </p:cxnSp>
+    </p:spTree>
+    <p:extLst>
+      <p:ext uri="{BB962C8B-B14F-4D97-AF65-F5344CB8AC3E}">
+        <p14:creationId xmlns:p14="http://schemas.microsoft.com/office/powerpoint/2010/main" val="2654454213"/>
+      </p:ext>
+    </p:extLst>
+  </p:cSld>
+  <p:clrMapOvr>
+    <a:masterClrMapping/>
+  </p:clrMapOvr>
+</p:sld>
+</file>
+
 <file path=ppt/slides/slide2.xml><?xml version="1.0" encoding="utf-8"?>
 <p:sld xmlns:a="http://schemas.openxmlformats.org/drawingml/2006/main" xmlns:r="http://schemas.openxmlformats.org/officeDocument/2006/relationships" xmlns:p="http://schemas.openxmlformats.org/presentationml/2006/main">
   <p:cSld>
@@ -4023,6 +4919,1210 @@
           <a:chExt cx="0" cy="0"/>
         </a:xfrm>
       </p:grpSpPr>
+      <p:sp>
+        <p:nvSpPr>
+          <p:cNvPr id="25" name="모서리가 둥근 직사각형 24">
+            <a:extLst>
+              <a:ext uri="{FF2B5EF4-FFF2-40B4-BE49-F238E27FC236}">
+                <a16:creationId xmlns:a16="http://schemas.microsoft.com/office/drawing/2014/main" id="{42E90FD3-C6FF-7142-89CD-BD58D763ED39}"/>
+              </a:ext>
+            </a:extLst>
+          </p:cNvPr>
+          <p:cNvSpPr/>
+          <p:nvPr/>
+        </p:nvSpPr>
+        <p:spPr>
+          <a:xfrm>
+            <a:off x="4720227" y="4036130"/>
+            <a:ext cx="1754155" cy="1786168"/>
+          </a:xfrm>
+          <a:prstGeom prst="roundRect">
+            <a:avLst/>
+          </a:prstGeom>
+          <a:solidFill>
+            <a:schemeClr val="accent4">
+              <a:lumMod val="40000"/>
+              <a:lumOff val="60000"/>
+            </a:schemeClr>
+          </a:solidFill>
+          <a:ln>
+            <a:noFill/>
+          </a:ln>
+        </p:spPr>
+        <p:style>
+          <a:lnRef idx="2">
+            <a:schemeClr val="accent1">
+              <a:shade val="50000"/>
+            </a:schemeClr>
+          </a:lnRef>
+          <a:fillRef idx="1">
+            <a:schemeClr val="accent1"/>
+          </a:fillRef>
+          <a:effectRef idx="0">
+            <a:schemeClr val="accent1"/>
+          </a:effectRef>
+          <a:fontRef idx="minor">
+            <a:schemeClr val="lt1"/>
+          </a:fontRef>
+        </p:style>
+        <p:txBody>
+          <a:bodyPr rtlCol="0" anchor="ctr"/>
+          <a:lstStyle/>
+          <a:p>
+            <a:pPr algn="ctr"/>
+            <a:endParaRPr kumimoji="1" lang="ko-Kore-KR" altLang="en-US"/>
+          </a:p>
+        </p:txBody>
+      </p:sp>
+      <p:sp>
+        <p:nvSpPr>
+          <p:cNvPr id="24" name="모서리가 둥근 직사각형 23">
+            <a:extLst>
+              <a:ext uri="{FF2B5EF4-FFF2-40B4-BE49-F238E27FC236}">
+                <a16:creationId xmlns:a16="http://schemas.microsoft.com/office/drawing/2014/main" id="{4DC06BFB-A09C-2042-89F9-1972234FA986}"/>
+              </a:ext>
+            </a:extLst>
+          </p:cNvPr>
+          <p:cNvSpPr/>
+          <p:nvPr/>
+        </p:nvSpPr>
+        <p:spPr>
+          <a:xfrm>
+            <a:off x="2821629" y="4036130"/>
+            <a:ext cx="1754155" cy="1786164"/>
+          </a:xfrm>
+          <a:prstGeom prst="roundRect">
+            <a:avLst/>
+          </a:prstGeom>
+          <a:solidFill>
+            <a:schemeClr val="accent4">
+              <a:lumMod val="40000"/>
+              <a:lumOff val="60000"/>
+            </a:schemeClr>
+          </a:solidFill>
+          <a:ln>
+            <a:noFill/>
+          </a:ln>
+        </p:spPr>
+        <p:style>
+          <a:lnRef idx="2">
+            <a:schemeClr val="accent1">
+              <a:shade val="50000"/>
+            </a:schemeClr>
+          </a:lnRef>
+          <a:fillRef idx="1">
+            <a:schemeClr val="accent1"/>
+          </a:fillRef>
+          <a:effectRef idx="0">
+            <a:schemeClr val="accent1"/>
+          </a:effectRef>
+          <a:fontRef idx="minor">
+            <a:schemeClr val="lt1"/>
+          </a:fontRef>
+        </p:style>
+        <p:txBody>
+          <a:bodyPr rtlCol="0" anchor="ctr"/>
+          <a:lstStyle/>
+          <a:p>
+            <a:pPr algn="ctr"/>
+            <a:endParaRPr kumimoji="1" lang="ko-Kore-KR" altLang="en-US"/>
+          </a:p>
+        </p:txBody>
+      </p:sp>
+      <p:sp>
+        <p:nvSpPr>
+          <p:cNvPr id="14" name="모서리가 둥근 직사각형 13">
+            <a:extLst>
+              <a:ext uri="{FF2B5EF4-FFF2-40B4-BE49-F238E27FC236}">
+                <a16:creationId xmlns:a16="http://schemas.microsoft.com/office/drawing/2014/main" id="{1116E730-0D4F-FC4E-9563-81584B9303C2}"/>
+              </a:ext>
+            </a:extLst>
+          </p:cNvPr>
+          <p:cNvSpPr/>
+          <p:nvPr/>
+        </p:nvSpPr>
+        <p:spPr>
+          <a:xfrm>
+            <a:off x="3673629" y="1362269"/>
+            <a:ext cx="1754155" cy="2313992"/>
+          </a:xfrm>
+          <a:prstGeom prst="roundRect">
+            <a:avLst/>
+          </a:prstGeom>
+          <a:solidFill>
+            <a:schemeClr val="accent4">
+              <a:lumMod val="40000"/>
+              <a:lumOff val="60000"/>
+            </a:schemeClr>
+          </a:solidFill>
+          <a:ln>
+            <a:noFill/>
+          </a:ln>
+        </p:spPr>
+        <p:style>
+          <a:lnRef idx="2">
+            <a:schemeClr val="accent1">
+              <a:shade val="50000"/>
+            </a:schemeClr>
+          </a:lnRef>
+          <a:fillRef idx="1">
+            <a:schemeClr val="accent1"/>
+          </a:fillRef>
+          <a:effectRef idx="0">
+            <a:schemeClr val="accent1"/>
+          </a:effectRef>
+          <a:fontRef idx="minor">
+            <a:schemeClr val="lt1"/>
+          </a:fontRef>
+        </p:style>
+        <p:txBody>
+          <a:bodyPr rtlCol="0" anchor="ctr"/>
+          <a:lstStyle/>
+          <a:p>
+            <a:pPr algn="ctr"/>
+            <a:endParaRPr kumimoji="1" lang="ko-Kore-KR" altLang="en-US"/>
+          </a:p>
+        </p:txBody>
+      </p:sp>
+      <p:sp>
+        <p:nvSpPr>
+          <p:cNvPr id="15" name="모서리가 둥근 직사각형 14">
+            <a:extLst>
+              <a:ext uri="{FF2B5EF4-FFF2-40B4-BE49-F238E27FC236}">
+                <a16:creationId xmlns:a16="http://schemas.microsoft.com/office/drawing/2014/main" id="{5063D0BA-DE07-9C45-B889-0ED307A1234F}"/>
+              </a:ext>
+            </a:extLst>
+          </p:cNvPr>
+          <p:cNvSpPr/>
+          <p:nvPr/>
+        </p:nvSpPr>
+        <p:spPr>
+          <a:xfrm>
+            <a:off x="5632657" y="1362269"/>
+            <a:ext cx="1754155" cy="2313992"/>
+          </a:xfrm>
+          <a:prstGeom prst="roundRect">
+            <a:avLst/>
+          </a:prstGeom>
+          <a:solidFill>
+            <a:schemeClr val="accent4">
+              <a:lumMod val="40000"/>
+              <a:lumOff val="60000"/>
+            </a:schemeClr>
+          </a:solidFill>
+          <a:ln>
+            <a:noFill/>
+          </a:ln>
+        </p:spPr>
+        <p:style>
+          <a:lnRef idx="2">
+            <a:schemeClr val="accent1">
+              <a:shade val="50000"/>
+            </a:schemeClr>
+          </a:lnRef>
+          <a:fillRef idx="1">
+            <a:schemeClr val="accent1"/>
+          </a:fillRef>
+          <a:effectRef idx="0">
+            <a:schemeClr val="accent1"/>
+          </a:effectRef>
+          <a:fontRef idx="minor">
+            <a:schemeClr val="lt1"/>
+          </a:fontRef>
+        </p:style>
+        <p:txBody>
+          <a:bodyPr rtlCol="0" anchor="ctr"/>
+          <a:lstStyle/>
+          <a:p>
+            <a:pPr algn="ctr"/>
+            <a:endParaRPr kumimoji="1" lang="ko-Kore-KR" altLang="en-US"/>
+          </a:p>
+        </p:txBody>
+      </p:sp>
+      <p:sp>
+        <p:nvSpPr>
+          <p:cNvPr id="13" name="모서리가 둥근 직사각형 12">
+            <a:extLst>
+              <a:ext uri="{FF2B5EF4-FFF2-40B4-BE49-F238E27FC236}">
+                <a16:creationId xmlns:a16="http://schemas.microsoft.com/office/drawing/2014/main" id="{74DF106D-EAE1-B648-BD7F-03164E08CF78}"/>
+              </a:ext>
+            </a:extLst>
+          </p:cNvPr>
+          <p:cNvSpPr/>
+          <p:nvPr/>
+        </p:nvSpPr>
+        <p:spPr>
+          <a:xfrm>
+            <a:off x="1714602" y="1362269"/>
+            <a:ext cx="1754155" cy="2313992"/>
+          </a:xfrm>
+          <a:prstGeom prst="roundRect">
+            <a:avLst/>
+          </a:prstGeom>
+          <a:solidFill>
+            <a:schemeClr val="accent4">
+              <a:lumMod val="40000"/>
+              <a:lumOff val="60000"/>
+            </a:schemeClr>
+          </a:solidFill>
+          <a:ln>
+            <a:noFill/>
+          </a:ln>
+        </p:spPr>
+        <p:style>
+          <a:lnRef idx="2">
+            <a:schemeClr val="accent1">
+              <a:shade val="50000"/>
+            </a:schemeClr>
+          </a:lnRef>
+          <a:fillRef idx="1">
+            <a:schemeClr val="accent1"/>
+          </a:fillRef>
+          <a:effectRef idx="0">
+            <a:schemeClr val="accent1"/>
+          </a:effectRef>
+          <a:fontRef idx="minor">
+            <a:schemeClr val="lt1"/>
+          </a:fontRef>
+        </p:style>
+        <p:txBody>
+          <a:bodyPr rtlCol="0" anchor="ctr"/>
+          <a:lstStyle/>
+          <a:p>
+            <a:pPr algn="ctr"/>
+            <a:endParaRPr kumimoji="1" lang="ko-Kore-KR" altLang="en-US"/>
+          </a:p>
+        </p:txBody>
+      </p:sp>
+      <p:sp>
+        <p:nvSpPr>
+          <p:cNvPr id="3" name="TextBox 2">
+            <a:extLst>
+              <a:ext uri="{FF2B5EF4-FFF2-40B4-BE49-F238E27FC236}">
+                <a16:creationId xmlns:a16="http://schemas.microsoft.com/office/drawing/2014/main" id="{C79CEE7D-68BE-E64B-AAA7-3A5556B60182}"/>
+              </a:ext>
+            </a:extLst>
+          </p:cNvPr>
+          <p:cNvSpPr txBox="1"/>
+          <p:nvPr/>
+        </p:nvSpPr>
+        <p:spPr>
+          <a:xfrm>
+            <a:off x="2174033" y="1520890"/>
+            <a:ext cx="837089" cy="369332"/>
+          </a:xfrm>
+          <a:prstGeom prst="rect">
+            <a:avLst/>
+          </a:prstGeom>
+          <a:noFill/>
+        </p:spPr>
+        <p:txBody>
+          <a:bodyPr wrap="none" rtlCol="0">
+            <a:spAutoFit/>
+          </a:bodyPr>
+          <a:lstStyle/>
+          <a:p>
+            <a:r>
+              <a:rPr kumimoji="1" lang="en-US" altLang="ko-Kore-KR" dirty="0"/>
+              <a:t>Class A</a:t>
+            </a:r>
+            <a:endParaRPr kumimoji="1" lang="ko-Kore-KR" altLang="en-US" dirty="0"/>
+          </a:p>
+        </p:txBody>
+      </p:sp>
+      <p:sp>
+        <p:nvSpPr>
+          <p:cNvPr id="4" name="TextBox 3">
+            <a:extLst>
+              <a:ext uri="{FF2B5EF4-FFF2-40B4-BE49-F238E27FC236}">
+                <a16:creationId xmlns:a16="http://schemas.microsoft.com/office/drawing/2014/main" id="{8FBDF8CB-327B-204D-A583-7AF8815D6DCF}"/>
+              </a:ext>
+            </a:extLst>
+          </p:cNvPr>
+          <p:cNvSpPr txBox="1"/>
+          <p:nvPr/>
+        </p:nvSpPr>
+        <p:spPr>
+          <a:xfrm>
+            <a:off x="4136171" y="1520890"/>
+            <a:ext cx="829073" cy="369332"/>
+          </a:xfrm>
+          <a:prstGeom prst="rect">
+            <a:avLst/>
+          </a:prstGeom>
+          <a:noFill/>
+        </p:spPr>
+        <p:txBody>
+          <a:bodyPr wrap="none" rtlCol="0">
+            <a:spAutoFit/>
+          </a:bodyPr>
+          <a:lstStyle/>
+          <a:p>
+            <a:r>
+              <a:rPr kumimoji="1" lang="en-US" altLang="ko-Kore-KR" dirty="0"/>
+              <a:t>Class B</a:t>
+            </a:r>
+            <a:endParaRPr kumimoji="1" lang="ko-Kore-KR" altLang="en-US" dirty="0"/>
+          </a:p>
+        </p:txBody>
+      </p:sp>
+      <p:sp>
+        <p:nvSpPr>
+          <p:cNvPr id="5" name="TextBox 4">
+            <a:extLst>
+              <a:ext uri="{FF2B5EF4-FFF2-40B4-BE49-F238E27FC236}">
+                <a16:creationId xmlns:a16="http://schemas.microsoft.com/office/drawing/2014/main" id="{029840E7-574B-984C-87D3-268C8A29FDD0}"/>
+              </a:ext>
+            </a:extLst>
+          </p:cNvPr>
+          <p:cNvSpPr txBox="1"/>
+          <p:nvPr/>
+        </p:nvSpPr>
+        <p:spPr>
+          <a:xfrm>
+            <a:off x="6096000" y="1520890"/>
+            <a:ext cx="827471" cy="369332"/>
+          </a:xfrm>
+          <a:prstGeom prst="rect">
+            <a:avLst/>
+          </a:prstGeom>
+          <a:noFill/>
+        </p:spPr>
+        <p:txBody>
+          <a:bodyPr wrap="none" rtlCol="0">
+            <a:spAutoFit/>
+          </a:bodyPr>
+          <a:lstStyle/>
+          <a:p>
+            <a:r>
+              <a:rPr kumimoji="1" lang="en-US" altLang="ko-Kore-KR" dirty="0"/>
+              <a:t>Class C</a:t>
+            </a:r>
+            <a:endParaRPr kumimoji="1" lang="ko-Kore-KR" altLang="en-US" dirty="0"/>
+          </a:p>
+        </p:txBody>
+      </p:sp>
+      <p:sp>
+        <p:nvSpPr>
+          <p:cNvPr id="6" name="TextBox 5">
+            <a:extLst>
+              <a:ext uri="{FF2B5EF4-FFF2-40B4-BE49-F238E27FC236}">
+                <a16:creationId xmlns:a16="http://schemas.microsoft.com/office/drawing/2014/main" id="{43B357F3-5C30-E04E-98E5-B034626E41DA}"/>
+              </a:ext>
+            </a:extLst>
+          </p:cNvPr>
+          <p:cNvSpPr txBox="1"/>
+          <p:nvPr/>
+        </p:nvSpPr>
+        <p:spPr>
+          <a:xfrm>
+            <a:off x="3204497" y="4160749"/>
+            <a:ext cx="1005403" cy="369332"/>
+          </a:xfrm>
+          <a:prstGeom prst="rect">
+            <a:avLst/>
+          </a:prstGeom>
+          <a:noFill/>
+        </p:spPr>
+        <p:txBody>
+          <a:bodyPr wrap="none" rtlCol="0">
+            <a:spAutoFit/>
+          </a:bodyPr>
+          <a:lstStyle/>
+          <a:p>
+            <a:r>
+              <a:rPr kumimoji="1" lang="en-US" altLang="ko-Kore-KR" dirty="0"/>
+              <a:t>Aspect A</a:t>
+            </a:r>
+            <a:endParaRPr kumimoji="1" lang="ko-Kore-KR" altLang="en-US" dirty="0"/>
+          </a:p>
+        </p:txBody>
+      </p:sp>
+      <p:sp>
+        <p:nvSpPr>
+          <p:cNvPr id="7" name="TextBox 6">
+            <a:extLst>
+              <a:ext uri="{FF2B5EF4-FFF2-40B4-BE49-F238E27FC236}">
+                <a16:creationId xmlns:a16="http://schemas.microsoft.com/office/drawing/2014/main" id="{A89FDB5C-58A4-E045-86CB-575A5AD9A7A3}"/>
+              </a:ext>
+            </a:extLst>
+          </p:cNvPr>
+          <p:cNvSpPr txBox="1"/>
+          <p:nvPr/>
+        </p:nvSpPr>
+        <p:spPr>
+          <a:xfrm>
+            <a:off x="5098611" y="4160749"/>
+            <a:ext cx="997389" cy="369332"/>
+          </a:xfrm>
+          <a:prstGeom prst="rect">
+            <a:avLst/>
+          </a:prstGeom>
+          <a:noFill/>
+        </p:spPr>
+        <p:txBody>
+          <a:bodyPr wrap="none" rtlCol="0">
+            <a:spAutoFit/>
+          </a:bodyPr>
+          <a:lstStyle/>
+          <a:p>
+            <a:r>
+              <a:rPr kumimoji="1" lang="en-US" altLang="ko-Kore-KR" dirty="0"/>
+              <a:t>Aspect B</a:t>
+            </a:r>
+            <a:endParaRPr kumimoji="1" lang="ko-Kore-KR" altLang="en-US" dirty="0"/>
+          </a:p>
+        </p:txBody>
+      </p:sp>
+      <p:sp>
+        <p:nvSpPr>
+          <p:cNvPr id="9" name="TextBox 8">
+            <a:extLst>
+              <a:ext uri="{FF2B5EF4-FFF2-40B4-BE49-F238E27FC236}">
+                <a16:creationId xmlns:a16="http://schemas.microsoft.com/office/drawing/2014/main" id="{84C75D0F-F651-A843-B38B-4398933E036F}"/>
+              </a:ext>
+            </a:extLst>
+          </p:cNvPr>
+          <p:cNvSpPr txBox="1"/>
+          <p:nvPr/>
+        </p:nvSpPr>
+        <p:spPr>
+          <a:xfrm>
+            <a:off x="3172760" y="4621435"/>
+            <a:ext cx="1051891" cy="307777"/>
+          </a:xfrm>
+          <a:prstGeom prst="rect">
+            <a:avLst/>
+          </a:prstGeom>
+          <a:noFill/>
+          <a:ln w="28575">
+            <a:solidFill>
+              <a:schemeClr val="accent5"/>
+            </a:solidFill>
+            <a:prstDash val="sysDot"/>
+          </a:ln>
+        </p:spPr>
+        <p:txBody>
+          <a:bodyPr wrap="square" rtlCol="0">
+            <a:spAutoFit/>
+          </a:bodyPr>
+          <a:lstStyle/>
+          <a:p>
+            <a:r>
+              <a:rPr kumimoji="1" lang="en-US" altLang="ko-KR" sz="1400"/>
+              <a:t>(</a:t>
+            </a:r>
+            <a:r>
+              <a:rPr kumimoji="1" lang="ko-KR" altLang="en-US" sz="1400"/>
+              <a:t>시간 측정</a:t>
+            </a:r>
+            <a:r>
+              <a:rPr kumimoji="1" lang="en-US" altLang="ko-KR" sz="1400"/>
+              <a:t>)</a:t>
+            </a:r>
+            <a:endParaRPr kumimoji="1" lang="ko-Kore-KR" altLang="en-US" sz="1400" dirty="0"/>
+          </a:p>
+        </p:txBody>
+      </p:sp>
+      <p:sp>
+        <p:nvSpPr>
+          <p:cNvPr id="11" name="TextBox 10">
+            <a:extLst>
+              <a:ext uri="{FF2B5EF4-FFF2-40B4-BE49-F238E27FC236}">
+                <a16:creationId xmlns:a16="http://schemas.microsoft.com/office/drawing/2014/main" id="{58FBE3B7-B3A9-4D40-8EAF-C6964C2A171E}"/>
+              </a:ext>
+            </a:extLst>
+          </p:cNvPr>
+          <p:cNvSpPr txBox="1"/>
+          <p:nvPr/>
+        </p:nvSpPr>
+        <p:spPr>
+          <a:xfrm>
+            <a:off x="5065226" y="4621434"/>
+            <a:ext cx="1134862" cy="307777"/>
+          </a:xfrm>
+          <a:prstGeom prst="rect">
+            <a:avLst/>
+          </a:prstGeom>
+          <a:noFill/>
+          <a:ln w="28575">
+            <a:solidFill>
+              <a:schemeClr val="accent5"/>
+            </a:solidFill>
+            <a:prstDash val="sysDot"/>
+          </a:ln>
+        </p:spPr>
+        <p:txBody>
+          <a:bodyPr wrap="none" rtlCol="0">
+            <a:spAutoFit/>
+          </a:bodyPr>
+          <a:lstStyle/>
+          <a:p>
+            <a:r>
+              <a:rPr kumimoji="1" lang="en-US" altLang="ko-KR" sz="1400" dirty="0"/>
+              <a:t>(Transaction)</a:t>
+            </a:r>
+            <a:endParaRPr kumimoji="1" lang="ko-Kore-KR" altLang="en-US" sz="1400" dirty="0"/>
+          </a:p>
+        </p:txBody>
+      </p:sp>
+      <p:sp>
+        <p:nvSpPr>
+          <p:cNvPr id="16" name="오른쪽 화살표[R] 15">
+            <a:extLst>
+              <a:ext uri="{FF2B5EF4-FFF2-40B4-BE49-F238E27FC236}">
+                <a16:creationId xmlns:a16="http://schemas.microsoft.com/office/drawing/2014/main" id="{85782810-E263-EF42-AD73-13A68CE4850D}"/>
+              </a:ext>
+            </a:extLst>
+          </p:cNvPr>
+          <p:cNvSpPr/>
+          <p:nvPr/>
+        </p:nvSpPr>
+        <p:spPr>
+          <a:xfrm>
+            <a:off x="8304245" y="4643587"/>
+            <a:ext cx="363894" cy="314586"/>
+          </a:xfrm>
+          <a:prstGeom prst="rightArrow">
+            <a:avLst/>
+          </a:prstGeom>
+        </p:spPr>
+        <p:style>
+          <a:lnRef idx="2">
+            <a:schemeClr val="accent1">
+              <a:shade val="50000"/>
+            </a:schemeClr>
+          </a:lnRef>
+          <a:fillRef idx="1">
+            <a:schemeClr val="accent1"/>
+          </a:fillRef>
+          <a:effectRef idx="0">
+            <a:schemeClr val="accent1"/>
+          </a:effectRef>
+          <a:fontRef idx="minor">
+            <a:schemeClr val="lt1"/>
+          </a:fontRef>
+        </p:style>
+        <p:txBody>
+          <a:bodyPr rtlCol="0" anchor="ctr"/>
+          <a:lstStyle/>
+          <a:p>
+            <a:pPr algn="ctr"/>
+            <a:endParaRPr kumimoji="1" lang="ko-Kore-KR" altLang="en-US"/>
+          </a:p>
+        </p:txBody>
+      </p:sp>
+      <p:sp>
+        <p:nvSpPr>
+          <p:cNvPr id="17" name="TextBox 16">
+            <a:extLst>
+              <a:ext uri="{FF2B5EF4-FFF2-40B4-BE49-F238E27FC236}">
+                <a16:creationId xmlns:a16="http://schemas.microsoft.com/office/drawing/2014/main" id="{386FEB3C-7D40-E544-845D-FF9D3997A87B}"/>
+              </a:ext>
+            </a:extLst>
+          </p:cNvPr>
+          <p:cNvSpPr txBox="1"/>
+          <p:nvPr/>
+        </p:nvSpPr>
+        <p:spPr>
+          <a:xfrm>
+            <a:off x="9227975" y="4621434"/>
+            <a:ext cx="906017" cy="400110"/>
+          </a:xfrm>
+          <a:prstGeom prst="rect">
+            <a:avLst/>
+          </a:prstGeom>
+          <a:noFill/>
+        </p:spPr>
+        <p:txBody>
+          <a:bodyPr wrap="none" rtlCol="0">
+            <a:spAutoFit/>
+          </a:bodyPr>
+          <a:lstStyle/>
+          <a:p>
+            <a:r>
+              <a:rPr kumimoji="1" lang="en-US" altLang="ko-Kore-KR" sz="2000" b="1" dirty="0"/>
+              <a:t>Aspect</a:t>
+            </a:r>
+            <a:endParaRPr kumimoji="1" lang="ko-Kore-KR" altLang="en-US" sz="2000" b="1" dirty="0"/>
+          </a:p>
+        </p:txBody>
+      </p:sp>
+      <p:sp>
+        <p:nvSpPr>
+          <p:cNvPr id="18" name="오른쪽 화살표[R] 17">
+            <a:extLst>
+              <a:ext uri="{FF2B5EF4-FFF2-40B4-BE49-F238E27FC236}">
+                <a16:creationId xmlns:a16="http://schemas.microsoft.com/office/drawing/2014/main" id="{53A65FD8-C7FD-2A45-8B2A-DA3623B43AEB}"/>
+              </a:ext>
+            </a:extLst>
+          </p:cNvPr>
+          <p:cNvSpPr/>
+          <p:nvPr/>
+        </p:nvSpPr>
+        <p:spPr>
+          <a:xfrm>
+            <a:off x="8304245" y="2218035"/>
+            <a:ext cx="363894" cy="314586"/>
+          </a:xfrm>
+          <a:prstGeom prst="rightArrow">
+            <a:avLst/>
+          </a:prstGeom>
+        </p:spPr>
+        <p:style>
+          <a:lnRef idx="2">
+            <a:schemeClr val="accent1">
+              <a:shade val="50000"/>
+            </a:schemeClr>
+          </a:lnRef>
+          <a:fillRef idx="1">
+            <a:schemeClr val="accent1"/>
+          </a:fillRef>
+          <a:effectRef idx="0">
+            <a:schemeClr val="accent1"/>
+          </a:effectRef>
+          <a:fontRef idx="minor">
+            <a:schemeClr val="lt1"/>
+          </a:fontRef>
+        </p:style>
+        <p:txBody>
+          <a:bodyPr rtlCol="0" anchor="ctr"/>
+          <a:lstStyle/>
+          <a:p>
+            <a:pPr algn="ctr"/>
+            <a:endParaRPr kumimoji="1" lang="ko-Kore-KR" altLang="en-US"/>
+          </a:p>
+        </p:txBody>
+      </p:sp>
+      <p:sp>
+        <p:nvSpPr>
+          <p:cNvPr id="19" name="TextBox 18">
+            <a:extLst>
+              <a:ext uri="{FF2B5EF4-FFF2-40B4-BE49-F238E27FC236}">
+                <a16:creationId xmlns:a16="http://schemas.microsoft.com/office/drawing/2014/main" id="{D8CFD327-0D28-6849-8580-A0337D42E6FF}"/>
+              </a:ext>
+            </a:extLst>
+          </p:cNvPr>
+          <p:cNvSpPr txBox="1"/>
+          <p:nvPr/>
+        </p:nvSpPr>
+        <p:spPr>
+          <a:xfrm>
+            <a:off x="9227975" y="2195882"/>
+            <a:ext cx="842218" cy="400110"/>
+          </a:xfrm>
+          <a:prstGeom prst="rect">
+            <a:avLst/>
+          </a:prstGeom>
+          <a:noFill/>
+        </p:spPr>
+        <p:txBody>
+          <a:bodyPr wrap="none" rtlCol="0">
+            <a:spAutoFit/>
+          </a:bodyPr>
+          <a:lstStyle/>
+          <a:p>
+            <a:r>
+              <a:rPr kumimoji="1" lang="en-US" altLang="ko-Kore-KR" sz="2000" b="1" dirty="0"/>
+              <a:t>Target</a:t>
+            </a:r>
+            <a:endParaRPr kumimoji="1" lang="ko-Kore-KR" altLang="en-US" sz="2000" b="1" dirty="0"/>
+          </a:p>
+        </p:txBody>
+      </p:sp>
+      <p:cxnSp>
+        <p:nvCxnSpPr>
+          <p:cNvPr id="21" name="직선 연결선[R] 20">
+            <a:extLst>
+              <a:ext uri="{FF2B5EF4-FFF2-40B4-BE49-F238E27FC236}">
+                <a16:creationId xmlns:a16="http://schemas.microsoft.com/office/drawing/2014/main" id="{F79CEFF1-5369-394E-B50F-2F642CCB281E}"/>
+              </a:ext>
+            </a:extLst>
+          </p:cNvPr>
+          <p:cNvCxnSpPr/>
+          <p:nvPr/>
+        </p:nvCxnSpPr>
+        <p:spPr>
+          <a:xfrm>
+            <a:off x="1045029" y="3862873"/>
+            <a:ext cx="9479902" cy="0"/>
+          </a:xfrm>
+          <a:prstGeom prst="line">
+            <a:avLst/>
+          </a:prstGeom>
+          <a:ln w="28575">
+            <a:solidFill>
+              <a:schemeClr val="accent6">
+                <a:lumMod val="40000"/>
+                <a:lumOff val="60000"/>
+              </a:schemeClr>
+            </a:solidFill>
+            <a:prstDash val="dash"/>
+          </a:ln>
+        </p:spPr>
+        <p:style>
+          <a:lnRef idx="1">
+            <a:schemeClr val="accent1"/>
+          </a:lnRef>
+          <a:fillRef idx="0">
+            <a:schemeClr val="accent1"/>
+          </a:fillRef>
+          <a:effectRef idx="0">
+            <a:schemeClr val="accent1"/>
+          </a:effectRef>
+          <a:fontRef idx="minor">
+            <a:schemeClr val="tx1"/>
+          </a:fontRef>
+        </p:style>
+      </p:cxnSp>
+      <p:cxnSp>
+        <p:nvCxnSpPr>
+          <p:cNvPr id="27" name="직선 연결선[R] 26">
+            <a:extLst>
+              <a:ext uri="{FF2B5EF4-FFF2-40B4-BE49-F238E27FC236}">
+                <a16:creationId xmlns:a16="http://schemas.microsoft.com/office/drawing/2014/main" id="{3D737016-1C70-4643-BAA8-A39404746B17}"/>
+              </a:ext>
+            </a:extLst>
+          </p:cNvPr>
+          <p:cNvCxnSpPr>
+            <a:stCxn id="9" idx="2"/>
+          </p:cNvCxnSpPr>
+          <p:nvPr/>
+        </p:nvCxnSpPr>
+        <p:spPr>
+          <a:xfrm flipH="1">
+            <a:off x="3011122" y="4929212"/>
+            <a:ext cx="687584" cy="1219661"/>
+          </a:xfrm>
+          <a:prstGeom prst="line">
+            <a:avLst/>
+          </a:prstGeom>
+          <a:ln w="19050">
+            <a:solidFill>
+              <a:schemeClr val="accent5"/>
+            </a:solidFill>
+          </a:ln>
+        </p:spPr>
+        <p:style>
+          <a:lnRef idx="1">
+            <a:schemeClr val="accent1"/>
+          </a:lnRef>
+          <a:fillRef idx="0">
+            <a:schemeClr val="accent1"/>
+          </a:fillRef>
+          <a:effectRef idx="0">
+            <a:schemeClr val="accent1"/>
+          </a:effectRef>
+          <a:fontRef idx="minor">
+            <a:schemeClr val="tx1"/>
+          </a:fontRef>
+        </p:style>
+      </p:cxnSp>
+      <p:cxnSp>
+        <p:nvCxnSpPr>
+          <p:cNvPr id="28" name="직선 연결선[R] 27">
+            <a:extLst>
+              <a:ext uri="{FF2B5EF4-FFF2-40B4-BE49-F238E27FC236}">
+                <a16:creationId xmlns:a16="http://schemas.microsoft.com/office/drawing/2014/main" id="{70C41394-41A8-0943-887A-E35577954BC2}"/>
+              </a:ext>
+            </a:extLst>
+          </p:cNvPr>
+          <p:cNvCxnSpPr>
+            <a:cxnSpLocks/>
+            <a:stCxn id="11" idx="2"/>
+          </p:cNvCxnSpPr>
+          <p:nvPr/>
+        </p:nvCxnSpPr>
+        <p:spPr>
+          <a:xfrm flipH="1">
+            <a:off x="3011122" y="4929211"/>
+            <a:ext cx="2621535" cy="1219662"/>
+          </a:xfrm>
+          <a:prstGeom prst="line">
+            <a:avLst/>
+          </a:prstGeom>
+          <a:ln w="19050">
+            <a:solidFill>
+              <a:schemeClr val="accent5"/>
+            </a:solidFill>
+          </a:ln>
+        </p:spPr>
+        <p:style>
+          <a:lnRef idx="1">
+            <a:schemeClr val="accent1"/>
+          </a:lnRef>
+          <a:fillRef idx="0">
+            <a:schemeClr val="accent1"/>
+          </a:fillRef>
+          <a:effectRef idx="0">
+            <a:schemeClr val="accent1"/>
+          </a:effectRef>
+          <a:fontRef idx="minor">
+            <a:schemeClr val="tx1"/>
+          </a:fontRef>
+        </p:style>
+      </p:cxnSp>
+      <p:sp>
+        <p:nvSpPr>
+          <p:cNvPr id="31" name="TextBox 30">
+            <a:extLst>
+              <a:ext uri="{FF2B5EF4-FFF2-40B4-BE49-F238E27FC236}">
+                <a16:creationId xmlns:a16="http://schemas.microsoft.com/office/drawing/2014/main" id="{82B3AF55-44E5-AD44-B821-97EF13F336A1}"/>
+              </a:ext>
+            </a:extLst>
+          </p:cNvPr>
+          <p:cNvSpPr txBox="1"/>
+          <p:nvPr/>
+        </p:nvSpPr>
+        <p:spPr>
+          <a:xfrm>
+            <a:off x="2485177" y="6154179"/>
+            <a:ext cx="899605" cy="400110"/>
+          </a:xfrm>
+          <a:prstGeom prst="rect">
+            <a:avLst/>
+          </a:prstGeom>
+          <a:noFill/>
+        </p:spPr>
+        <p:txBody>
+          <a:bodyPr wrap="none" rtlCol="0">
+            <a:spAutoFit/>
+          </a:bodyPr>
+          <a:lstStyle/>
+          <a:p>
+            <a:r>
+              <a:rPr kumimoji="1" lang="en-US" altLang="ko-Kore-KR" sz="2000" b="1" dirty="0"/>
+              <a:t>Advice</a:t>
+            </a:r>
+            <a:endParaRPr kumimoji="1" lang="ko-Kore-KR" altLang="en-US" sz="2000" b="1" dirty="0"/>
+          </a:p>
+        </p:txBody>
+      </p:sp>
+      <p:cxnSp>
+        <p:nvCxnSpPr>
+          <p:cNvPr id="33" name="구부러진 연결선[U] 32">
+            <a:extLst>
+              <a:ext uri="{FF2B5EF4-FFF2-40B4-BE49-F238E27FC236}">
+                <a16:creationId xmlns:a16="http://schemas.microsoft.com/office/drawing/2014/main" id="{8405D473-465A-3441-B95F-63E773BD7891}"/>
+              </a:ext>
+            </a:extLst>
+          </p:cNvPr>
+          <p:cNvCxnSpPr>
+            <a:cxnSpLocks/>
+            <a:stCxn id="24" idx="0"/>
+            <a:endCxn id="39" idx="2"/>
+          </p:cNvCxnSpPr>
+          <p:nvPr/>
+        </p:nvCxnSpPr>
+        <p:spPr>
+          <a:xfrm rot="16200000" flipV="1">
+            <a:off x="2408719" y="2746142"/>
+            <a:ext cx="1472949" cy="1107028"/>
+          </a:xfrm>
+          <a:prstGeom prst="curvedConnector3">
+            <a:avLst>
+              <a:gd name="adj1" fmla="val 50000"/>
+            </a:avLst>
+          </a:prstGeom>
+          <a:ln>
+            <a:tailEnd type="triangle"/>
+          </a:ln>
+        </p:spPr>
+        <p:style>
+          <a:lnRef idx="1">
+            <a:schemeClr val="accent2"/>
+          </a:lnRef>
+          <a:fillRef idx="0">
+            <a:schemeClr val="accent2"/>
+          </a:fillRef>
+          <a:effectRef idx="0">
+            <a:schemeClr val="accent2"/>
+          </a:effectRef>
+          <a:fontRef idx="minor">
+            <a:schemeClr val="tx1"/>
+          </a:fontRef>
+        </p:style>
+      </p:cxnSp>
+      <p:cxnSp>
+        <p:nvCxnSpPr>
+          <p:cNvPr id="36" name="구부러진 연결선[U] 35">
+            <a:extLst>
+              <a:ext uri="{FF2B5EF4-FFF2-40B4-BE49-F238E27FC236}">
+                <a16:creationId xmlns:a16="http://schemas.microsoft.com/office/drawing/2014/main" id="{755CE37D-C9CE-D845-AF76-7C316B66D8A5}"/>
+              </a:ext>
+            </a:extLst>
+          </p:cNvPr>
+          <p:cNvCxnSpPr>
+            <a:cxnSpLocks/>
+            <a:stCxn id="24" idx="0"/>
+            <a:endCxn id="40" idx="2"/>
+          </p:cNvCxnSpPr>
+          <p:nvPr/>
+        </p:nvCxnSpPr>
+        <p:spPr>
+          <a:xfrm rot="5400000" flipH="1" flipV="1">
+            <a:off x="3235859" y="2688002"/>
+            <a:ext cx="1810976" cy="885281"/>
+          </a:xfrm>
+          <a:prstGeom prst="curvedConnector3">
+            <a:avLst>
+              <a:gd name="adj1" fmla="val 50000"/>
+            </a:avLst>
+          </a:prstGeom>
+          <a:ln>
+            <a:tailEnd type="triangle"/>
+          </a:ln>
+        </p:spPr>
+        <p:style>
+          <a:lnRef idx="1">
+            <a:schemeClr val="accent2"/>
+          </a:lnRef>
+          <a:fillRef idx="0">
+            <a:schemeClr val="accent2"/>
+          </a:fillRef>
+          <a:effectRef idx="0">
+            <a:schemeClr val="accent2"/>
+          </a:effectRef>
+          <a:fontRef idx="minor">
+            <a:schemeClr val="tx1"/>
+          </a:fontRef>
+        </p:style>
+      </p:cxnSp>
+      <p:sp>
+        <p:nvSpPr>
+          <p:cNvPr id="39" name="TextBox 38">
+            <a:extLst>
+              <a:ext uri="{FF2B5EF4-FFF2-40B4-BE49-F238E27FC236}">
+                <a16:creationId xmlns:a16="http://schemas.microsoft.com/office/drawing/2014/main" id="{3C2CD7D0-487C-CC43-AA5C-FC05BDFCDE6A}"/>
+              </a:ext>
+            </a:extLst>
+          </p:cNvPr>
+          <p:cNvSpPr txBox="1"/>
+          <p:nvPr/>
+        </p:nvSpPr>
+        <p:spPr>
+          <a:xfrm>
+            <a:off x="2065733" y="2255404"/>
+            <a:ext cx="1051891" cy="307777"/>
+          </a:xfrm>
+          <a:prstGeom prst="rect">
+            <a:avLst/>
+          </a:prstGeom>
+          <a:noFill/>
+          <a:ln w="28575">
+            <a:solidFill>
+              <a:schemeClr val="accent2"/>
+            </a:solidFill>
+            <a:prstDash val="sysDot"/>
+          </a:ln>
+        </p:spPr>
+        <p:txBody>
+          <a:bodyPr wrap="square" rtlCol="0">
+            <a:spAutoFit/>
+          </a:bodyPr>
+          <a:lstStyle/>
+          <a:p>
+            <a:endParaRPr kumimoji="1" lang="ko-Kore-KR" altLang="en-US" sz="1400" dirty="0"/>
+          </a:p>
+        </p:txBody>
+      </p:sp>
+      <p:sp>
+        <p:nvSpPr>
+          <p:cNvPr id="40" name="TextBox 39">
+            <a:extLst>
+              <a:ext uri="{FF2B5EF4-FFF2-40B4-BE49-F238E27FC236}">
+                <a16:creationId xmlns:a16="http://schemas.microsoft.com/office/drawing/2014/main" id="{9868E16A-956C-7A4A-AF3F-F9827A634E30}"/>
+              </a:ext>
+            </a:extLst>
+          </p:cNvPr>
+          <p:cNvSpPr txBox="1"/>
+          <p:nvPr/>
+        </p:nvSpPr>
+        <p:spPr>
+          <a:xfrm>
+            <a:off x="4058042" y="1917377"/>
+            <a:ext cx="1051891" cy="307777"/>
+          </a:xfrm>
+          <a:prstGeom prst="rect">
+            <a:avLst/>
+          </a:prstGeom>
+          <a:noFill/>
+          <a:ln w="28575">
+            <a:solidFill>
+              <a:schemeClr val="accent2"/>
+            </a:solidFill>
+            <a:prstDash val="sysDot"/>
+          </a:ln>
+        </p:spPr>
+        <p:txBody>
+          <a:bodyPr wrap="square" rtlCol="0">
+            <a:spAutoFit/>
+          </a:bodyPr>
+          <a:lstStyle/>
+          <a:p>
+            <a:endParaRPr kumimoji="1" lang="ko-Kore-KR" altLang="en-US" sz="1400" dirty="0"/>
+          </a:p>
+        </p:txBody>
+      </p:sp>
+      <p:sp>
+        <p:nvSpPr>
+          <p:cNvPr id="43" name="TextBox 42">
+            <a:extLst>
+              <a:ext uri="{FF2B5EF4-FFF2-40B4-BE49-F238E27FC236}">
+                <a16:creationId xmlns:a16="http://schemas.microsoft.com/office/drawing/2014/main" id="{964E741B-D9CC-F24C-9059-3AF559F0608E}"/>
+              </a:ext>
+            </a:extLst>
+          </p:cNvPr>
+          <p:cNvSpPr txBox="1"/>
+          <p:nvPr/>
+        </p:nvSpPr>
+        <p:spPr>
+          <a:xfrm>
+            <a:off x="477292" y="2224626"/>
+            <a:ext cx="1227452" cy="400110"/>
+          </a:xfrm>
+          <a:prstGeom prst="rect">
+            <a:avLst/>
+          </a:prstGeom>
+          <a:noFill/>
+        </p:spPr>
+        <p:txBody>
+          <a:bodyPr wrap="none" rtlCol="0">
+            <a:spAutoFit/>
+          </a:bodyPr>
+          <a:lstStyle/>
+          <a:p>
+            <a:r>
+              <a:rPr kumimoji="1" lang="en-US" altLang="ko-Kore-KR" sz="2000" b="1" dirty="0"/>
+              <a:t>Join point</a:t>
+            </a:r>
+            <a:endParaRPr kumimoji="1" lang="ko-Kore-KR" altLang="en-US" sz="2000" b="1" dirty="0"/>
+          </a:p>
+        </p:txBody>
+      </p:sp>
+      <p:sp>
+        <p:nvSpPr>
+          <p:cNvPr id="44" name="TextBox 43">
+            <a:extLst>
+              <a:ext uri="{FF2B5EF4-FFF2-40B4-BE49-F238E27FC236}">
+                <a16:creationId xmlns:a16="http://schemas.microsoft.com/office/drawing/2014/main" id="{7C06F156-F9D3-3541-B393-17AB6D4E7C89}"/>
+              </a:ext>
+            </a:extLst>
+          </p:cNvPr>
+          <p:cNvSpPr txBox="1"/>
+          <p:nvPr/>
+        </p:nvSpPr>
+        <p:spPr>
+          <a:xfrm>
+            <a:off x="3243863" y="5383711"/>
+            <a:ext cx="859531" cy="261610"/>
+          </a:xfrm>
+          <a:prstGeom prst="rect">
+            <a:avLst/>
+          </a:prstGeom>
+          <a:noFill/>
+          <a:ln w="28575">
+            <a:solidFill>
+              <a:srgbClr val="FF0000"/>
+            </a:solidFill>
+            <a:prstDash val="sysDot"/>
+          </a:ln>
+        </p:spPr>
+        <p:txBody>
+          <a:bodyPr wrap="none" rtlCol="0">
+            <a:spAutoFit/>
+          </a:bodyPr>
+          <a:lstStyle/>
+          <a:p>
+            <a:r>
+              <a:rPr kumimoji="1" lang="en-US" altLang="ko-Kore-KR" sz="1100" dirty="0"/>
+              <a:t>target : A, B</a:t>
+            </a:r>
+            <a:endParaRPr kumimoji="1" lang="ko-Kore-KR" altLang="en-US" sz="1100" dirty="0"/>
+          </a:p>
+        </p:txBody>
+      </p:sp>
+      <p:cxnSp>
+        <p:nvCxnSpPr>
+          <p:cNvPr id="45" name="직선 연결선[R] 44">
+            <a:extLst>
+              <a:ext uri="{FF2B5EF4-FFF2-40B4-BE49-F238E27FC236}">
+                <a16:creationId xmlns:a16="http://schemas.microsoft.com/office/drawing/2014/main" id="{56E7FE7F-D59E-AE45-8593-B1CD18998D44}"/>
+              </a:ext>
+            </a:extLst>
+          </p:cNvPr>
+          <p:cNvCxnSpPr>
+            <a:cxnSpLocks/>
+            <a:stCxn id="44" idx="3"/>
+            <a:endCxn id="48" idx="0"/>
+          </p:cNvCxnSpPr>
+          <p:nvPr/>
+        </p:nvCxnSpPr>
+        <p:spPr>
+          <a:xfrm>
+            <a:off x="4103394" y="5514516"/>
+            <a:ext cx="1219509" cy="639663"/>
+          </a:xfrm>
+          <a:prstGeom prst="line">
+            <a:avLst/>
+          </a:prstGeom>
+          <a:ln w="19050">
+            <a:solidFill>
+              <a:srgbClr val="FF0000"/>
+            </a:solidFill>
+          </a:ln>
+        </p:spPr>
+        <p:style>
+          <a:lnRef idx="1">
+            <a:schemeClr val="accent1"/>
+          </a:lnRef>
+          <a:fillRef idx="0">
+            <a:schemeClr val="accent1"/>
+          </a:fillRef>
+          <a:effectRef idx="0">
+            <a:schemeClr val="accent1"/>
+          </a:effectRef>
+          <a:fontRef idx="minor">
+            <a:schemeClr val="tx1"/>
+          </a:fontRef>
+        </p:style>
+      </p:cxnSp>
+      <p:sp>
+        <p:nvSpPr>
+          <p:cNvPr id="48" name="TextBox 47">
+            <a:extLst>
+              <a:ext uri="{FF2B5EF4-FFF2-40B4-BE49-F238E27FC236}">
+                <a16:creationId xmlns:a16="http://schemas.microsoft.com/office/drawing/2014/main" id="{F3B17E69-FD2E-8D4F-93BB-C28360B0232B}"/>
+              </a:ext>
+            </a:extLst>
+          </p:cNvPr>
+          <p:cNvSpPr txBox="1"/>
+          <p:nvPr/>
+        </p:nvSpPr>
+        <p:spPr>
+          <a:xfrm>
+            <a:off x="4787467" y="6154179"/>
+            <a:ext cx="1070871" cy="400110"/>
+          </a:xfrm>
+          <a:prstGeom prst="rect">
+            <a:avLst/>
+          </a:prstGeom>
+          <a:noFill/>
+        </p:spPr>
+        <p:txBody>
+          <a:bodyPr wrap="none" rtlCol="0">
+            <a:spAutoFit/>
+          </a:bodyPr>
+          <a:lstStyle/>
+          <a:p>
+            <a:r>
+              <a:rPr kumimoji="1" lang="en-US" altLang="ko-Kore-KR" sz="2000" b="1" dirty="0"/>
+              <a:t>Pointcut</a:t>
+            </a:r>
+            <a:endParaRPr kumimoji="1" lang="ko-Kore-KR" altLang="en-US" sz="2000" b="1" dirty="0"/>
+          </a:p>
+        </p:txBody>
+      </p:sp>
     </p:spTree>
     <p:extLst>
       <p:ext uri="{BB962C8B-B14F-4D97-AF65-F5344CB8AC3E}">
@@ -4053,436 +6153,70 @@
           <a:chExt cx="0" cy="0"/>
         </a:xfrm>
       </p:grpSpPr>
-      <p:sp>
-        <p:nvSpPr>
-          <p:cNvPr id="2" name="TextBox 1">
-            <a:extLst>
-              <a:ext uri="{FF2B5EF4-FFF2-40B4-BE49-F238E27FC236}">
-                <a16:creationId xmlns:a16="http://schemas.microsoft.com/office/drawing/2014/main" id="{95D8167B-BF61-7341-9BB4-3E7A7248748C}"/>
-              </a:ext>
-            </a:extLst>
-          </p:cNvPr>
-          <p:cNvSpPr txBox="1"/>
-          <p:nvPr/>
-        </p:nvSpPr>
-        <p:spPr>
-          <a:xfrm>
-            <a:off x="2718487" y="2829697"/>
-            <a:ext cx="1227772" cy="646331"/>
-          </a:xfrm>
-          <a:prstGeom prst="rect">
-            <a:avLst/>
-          </a:prstGeom>
-          <a:noFill/>
-          <a:ln>
-            <a:solidFill>
-              <a:schemeClr val="bg2">
-                <a:lumMod val="75000"/>
-              </a:schemeClr>
-            </a:solidFill>
-          </a:ln>
-        </p:spPr>
-        <p:txBody>
-          <a:bodyPr wrap="none" rtlCol="0">
-            <a:spAutoFit/>
-          </a:bodyPr>
-          <a:lstStyle/>
-          <a:p>
-            <a:pPr algn="ctr"/>
-            <a:r>
-              <a:rPr kumimoji="1" lang="en-US" altLang="ko-Kore-KR" dirty="0"/>
-              <a:t>Conversion</a:t>
-            </a:r>
-          </a:p>
-          <a:p>
-            <a:pPr algn="ctr"/>
-            <a:r>
-              <a:rPr kumimoji="1" lang="en-US" altLang="ko-Kore-KR" dirty="0"/>
-              <a:t>Service</a:t>
-            </a:r>
-            <a:endParaRPr kumimoji="1" lang="ko-Kore-KR" altLang="en-US" dirty="0"/>
-          </a:p>
-        </p:txBody>
-      </p:sp>
-      <p:sp>
-        <p:nvSpPr>
-          <p:cNvPr id="3" name="TextBox 2">
-            <a:extLst>
-              <a:ext uri="{FF2B5EF4-FFF2-40B4-BE49-F238E27FC236}">
-                <a16:creationId xmlns:a16="http://schemas.microsoft.com/office/drawing/2014/main" id="{36AB6AFB-FC0F-CC4A-A2DA-996A45B0836E}"/>
-              </a:ext>
-            </a:extLst>
-          </p:cNvPr>
-          <p:cNvSpPr txBox="1"/>
-          <p:nvPr/>
-        </p:nvSpPr>
-        <p:spPr>
-          <a:xfrm>
-            <a:off x="5966344" y="1466674"/>
-            <a:ext cx="1115434" cy="646331"/>
-          </a:xfrm>
-          <a:prstGeom prst="rect">
-            <a:avLst/>
-          </a:prstGeom>
-          <a:noFill/>
-          <a:ln>
-            <a:solidFill>
-              <a:schemeClr val="bg2">
-                <a:lumMod val="75000"/>
-              </a:schemeClr>
-            </a:solidFill>
-          </a:ln>
-        </p:spPr>
-        <p:txBody>
-          <a:bodyPr wrap="none" rtlCol="0">
-            <a:spAutoFit/>
-          </a:bodyPr>
-          <a:lstStyle/>
-          <a:p>
-            <a:pPr algn="ctr"/>
-            <a:r>
-              <a:rPr kumimoji="1" lang="en-US" altLang="ko-Kore-KR" dirty="0"/>
-              <a:t>Converter</a:t>
-            </a:r>
-          </a:p>
-          <a:p>
-            <a:pPr algn="ctr"/>
-            <a:r>
-              <a:rPr kumimoji="1" lang="en-US" altLang="ko-Kore-KR" dirty="0"/>
-              <a:t>Registry</a:t>
-            </a:r>
-          </a:p>
-        </p:txBody>
-      </p:sp>
-      <p:sp>
-        <p:nvSpPr>
-          <p:cNvPr id="4" name="TextBox 3">
-            <a:extLst>
-              <a:ext uri="{FF2B5EF4-FFF2-40B4-BE49-F238E27FC236}">
-                <a16:creationId xmlns:a16="http://schemas.microsoft.com/office/drawing/2014/main" id="{E5104C7B-FB03-4F40-9D6C-69B3F56C09C0}"/>
-              </a:ext>
-            </a:extLst>
-          </p:cNvPr>
-          <p:cNvSpPr txBox="1"/>
-          <p:nvPr/>
-        </p:nvSpPr>
-        <p:spPr>
-          <a:xfrm>
-            <a:off x="5955957" y="2829697"/>
-            <a:ext cx="1125821" cy="646331"/>
-          </a:xfrm>
-          <a:prstGeom prst="rect">
-            <a:avLst/>
-          </a:prstGeom>
-          <a:noFill/>
-          <a:ln>
-            <a:solidFill>
-              <a:schemeClr val="bg2">
-                <a:lumMod val="75000"/>
-              </a:schemeClr>
-            </a:solidFill>
-          </a:ln>
-        </p:spPr>
-        <p:txBody>
-          <a:bodyPr wrap="none" rtlCol="0">
-            <a:spAutoFit/>
-          </a:bodyPr>
-          <a:lstStyle/>
-          <a:p>
-            <a:pPr algn="ctr"/>
-            <a:r>
-              <a:rPr kumimoji="1" lang="en-US" altLang="ko-Kore-KR" dirty="0"/>
-              <a:t>Formatter</a:t>
-            </a:r>
-          </a:p>
-          <a:p>
-            <a:pPr algn="ctr"/>
-            <a:r>
-              <a:rPr kumimoji="1" lang="en-US" altLang="ko-Kore-KR" dirty="0"/>
-              <a:t>Registry</a:t>
-            </a:r>
-          </a:p>
-        </p:txBody>
-      </p:sp>
-      <p:sp>
-        <p:nvSpPr>
-          <p:cNvPr id="5" name="TextBox 4">
-            <a:extLst>
-              <a:ext uri="{FF2B5EF4-FFF2-40B4-BE49-F238E27FC236}">
-                <a16:creationId xmlns:a16="http://schemas.microsoft.com/office/drawing/2014/main" id="{B076E696-6C39-7A41-B171-0B677FC86E9C}"/>
-              </a:ext>
-            </a:extLst>
-          </p:cNvPr>
-          <p:cNvSpPr txBox="1"/>
-          <p:nvPr/>
-        </p:nvSpPr>
-        <p:spPr>
-          <a:xfrm>
-            <a:off x="4065503" y="4207984"/>
-            <a:ext cx="1900841" cy="646331"/>
-          </a:xfrm>
-          <a:prstGeom prst="rect">
-            <a:avLst/>
-          </a:prstGeom>
-          <a:noFill/>
-          <a:ln>
-            <a:solidFill>
-              <a:schemeClr val="bg2">
-                <a:lumMod val="75000"/>
-              </a:schemeClr>
-            </a:solidFill>
-          </a:ln>
-        </p:spPr>
-        <p:txBody>
-          <a:bodyPr wrap="none" rtlCol="0">
-            <a:spAutoFit/>
-          </a:bodyPr>
-          <a:lstStyle/>
-          <a:p>
-            <a:pPr algn="ctr"/>
-            <a:r>
-              <a:rPr kumimoji="1" lang="en-US" altLang="ko-Kore-KR" dirty="0" err="1"/>
-              <a:t>DefaultFormatting</a:t>
-            </a:r>
-            <a:endParaRPr kumimoji="1" lang="en-US" altLang="ko-Kore-KR" dirty="0"/>
-          </a:p>
-          <a:p>
-            <a:pPr algn="ctr"/>
-            <a:r>
-              <a:rPr kumimoji="1" lang="en-US" altLang="ko-Kore-KR" dirty="0" err="1"/>
-              <a:t>ConversionService</a:t>
-            </a:r>
-            <a:endParaRPr kumimoji="1" lang="ko-Kore-KR" altLang="en-US" dirty="0"/>
-          </a:p>
-        </p:txBody>
-      </p:sp>
-      <p:sp>
-        <p:nvSpPr>
-          <p:cNvPr id="6" name="TextBox 5">
-            <a:extLst>
-              <a:ext uri="{FF2B5EF4-FFF2-40B4-BE49-F238E27FC236}">
-                <a16:creationId xmlns:a16="http://schemas.microsoft.com/office/drawing/2014/main" id="{80DED452-3663-6141-BBFC-7DE813DBC312}"/>
-              </a:ext>
-            </a:extLst>
-          </p:cNvPr>
-          <p:cNvSpPr txBox="1"/>
-          <p:nvPr/>
-        </p:nvSpPr>
-        <p:spPr>
-          <a:xfrm>
-            <a:off x="3506009" y="5586271"/>
-            <a:ext cx="3041004" cy="461665"/>
-          </a:xfrm>
-          <a:prstGeom prst="rect">
-            <a:avLst/>
-          </a:prstGeom>
-          <a:noFill/>
-          <a:ln>
-            <a:solidFill>
-              <a:schemeClr val="bg2">
-                <a:lumMod val="75000"/>
-              </a:schemeClr>
-            </a:solidFill>
-          </a:ln>
-        </p:spPr>
-        <p:txBody>
-          <a:bodyPr wrap="square" rtlCol="0">
-            <a:spAutoFit/>
-          </a:bodyPr>
-          <a:lstStyle/>
-          <a:p>
-            <a:pPr algn="ctr"/>
-            <a:r>
-              <a:rPr kumimoji="1" lang="en-US" altLang="ko-Kore-KR" sz="2400" dirty="0" err="1">
-                <a:solidFill>
-                  <a:srgbClr val="FF0000"/>
-                </a:solidFill>
-              </a:rPr>
-              <a:t>WebConversionService</a:t>
-            </a:r>
-            <a:endParaRPr kumimoji="1" lang="ko-Kore-KR" altLang="en-US" sz="2400" dirty="0">
-              <a:solidFill>
-                <a:srgbClr val="FF0000"/>
-              </a:solidFill>
-            </a:endParaRPr>
-          </a:p>
-        </p:txBody>
-      </p:sp>
-      <p:cxnSp>
-        <p:nvCxnSpPr>
-          <p:cNvPr id="8" name="직선 화살표 연결선 7">
-            <a:extLst>
-              <a:ext uri="{FF2B5EF4-FFF2-40B4-BE49-F238E27FC236}">
-                <a16:creationId xmlns:a16="http://schemas.microsoft.com/office/drawing/2014/main" id="{1860C994-7D7C-0C4C-A8CE-4286F1807CC9}"/>
-              </a:ext>
-            </a:extLst>
-          </p:cNvPr>
-          <p:cNvCxnSpPr>
-            <a:stCxn id="4" idx="0"/>
-            <a:endCxn id="3" idx="2"/>
-          </p:cNvCxnSpPr>
-          <p:nvPr/>
-        </p:nvCxnSpPr>
-        <p:spPr>
-          <a:xfrm flipV="1">
-            <a:off x="6518868" y="2113005"/>
-            <a:ext cx="5193" cy="716692"/>
-          </a:xfrm>
-          <a:prstGeom prst="straightConnector1">
-            <a:avLst/>
-          </a:prstGeom>
-          <a:ln>
-            <a:tailEnd type="triangle"/>
-          </a:ln>
-        </p:spPr>
-        <p:style>
-          <a:lnRef idx="1">
-            <a:schemeClr val="accent1"/>
-          </a:lnRef>
-          <a:fillRef idx="0">
-            <a:schemeClr val="accent1"/>
-          </a:fillRef>
-          <a:effectRef idx="0">
-            <a:schemeClr val="accent1"/>
-          </a:effectRef>
-          <a:fontRef idx="minor">
-            <a:schemeClr val="tx1"/>
-          </a:fontRef>
-        </p:style>
-      </p:cxnSp>
-      <p:cxnSp>
-        <p:nvCxnSpPr>
-          <p:cNvPr id="9" name="직선 화살표 연결선 8">
-            <a:extLst>
-              <a:ext uri="{FF2B5EF4-FFF2-40B4-BE49-F238E27FC236}">
-                <a16:creationId xmlns:a16="http://schemas.microsoft.com/office/drawing/2014/main" id="{01330319-2B24-E742-AA91-B18C6D3C80B9}"/>
-              </a:ext>
-            </a:extLst>
-          </p:cNvPr>
-          <p:cNvCxnSpPr>
-            <a:cxnSpLocks/>
-            <a:stCxn id="5" idx="0"/>
-            <a:endCxn id="2" idx="2"/>
-          </p:cNvCxnSpPr>
-          <p:nvPr/>
-        </p:nvCxnSpPr>
-        <p:spPr>
-          <a:xfrm flipH="1" flipV="1">
-            <a:off x="3332373" y="3476028"/>
-            <a:ext cx="1683551" cy="731956"/>
-          </a:xfrm>
-          <a:prstGeom prst="straightConnector1">
-            <a:avLst/>
-          </a:prstGeom>
-          <a:ln>
-            <a:tailEnd type="triangle"/>
-          </a:ln>
-        </p:spPr>
-        <p:style>
-          <a:lnRef idx="1">
-            <a:schemeClr val="accent1"/>
-          </a:lnRef>
-          <a:fillRef idx="0">
-            <a:schemeClr val="accent1"/>
-          </a:fillRef>
-          <a:effectRef idx="0">
-            <a:schemeClr val="accent1"/>
-          </a:effectRef>
-          <a:fontRef idx="minor">
-            <a:schemeClr val="tx1"/>
-          </a:fontRef>
-        </p:style>
-      </p:cxnSp>
-      <p:cxnSp>
-        <p:nvCxnSpPr>
-          <p:cNvPr id="12" name="직선 화살표 연결선 11">
-            <a:extLst>
-              <a:ext uri="{FF2B5EF4-FFF2-40B4-BE49-F238E27FC236}">
-                <a16:creationId xmlns:a16="http://schemas.microsoft.com/office/drawing/2014/main" id="{A177D0E1-E606-CC44-B4DC-07681439C58C}"/>
-              </a:ext>
-            </a:extLst>
-          </p:cNvPr>
-          <p:cNvCxnSpPr>
-            <a:cxnSpLocks/>
-            <a:stCxn id="5" idx="0"/>
-            <a:endCxn id="4" idx="2"/>
-          </p:cNvCxnSpPr>
-          <p:nvPr/>
-        </p:nvCxnSpPr>
-        <p:spPr>
-          <a:xfrm flipV="1">
-            <a:off x="5015924" y="3476028"/>
-            <a:ext cx="1502944" cy="731956"/>
-          </a:xfrm>
-          <a:prstGeom prst="straightConnector1">
-            <a:avLst/>
-          </a:prstGeom>
-          <a:ln>
-            <a:tailEnd type="triangle"/>
-          </a:ln>
-        </p:spPr>
-        <p:style>
-          <a:lnRef idx="1">
-            <a:schemeClr val="accent1"/>
-          </a:lnRef>
-          <a:fillRef idx="0">
-            <a:schemeClr val="accent1"/>
-          </a:fillRef>
-          <a:effectRef idx="0">
-            <a:schemeClr val="accent1"/>
-          </a:effectRef>
-          <a:fontRef idx="minor">
-            <a:schemeClr val="tx1"/>
-          </a:fontRef>
-        </p:style>
-      </p:cxnSp>
-      <p:cxnSp>
-        <p:nvCxnSpPr>
-          <p:cNvPr id="15" name="직선 화살표 연결선 14">
-            <a:extLst>
-              <a:ext uri="{FF2B5EF4-FFF2-40B4-BE49-F238E27FC236}">
-                <a16:creationId xmlns:a16="http://schemas.microsoft.com/office/drawing/2014/main" id="{114E6FF3-D384-D048-84E7-29B1F8444123}"/>
-              </a:ext>
-            </a:extLst>
-          </p:cNvPr>
-          <p:cNvCxnSpPr>
-            <a:cxnSpLocks/>
-            <a:stCxn id="6" idx="0"/>
-            <a:endCxn id="5" idx="2"/>
-          </p:cNvCxnSpPr>
-          <p:nvPr/>
-        </p:nvCxnSpPr>
-        <p:spPr>
-          <a:xfrm flipH="1" flipV="1">
-            <a:off x="5015924" y="4854315"/>
-            <a:ext cx="10587" cy="731956"/>
-          </a:xfrm>
-          <a:prstGeom prst="straightConnector1">
-            <a:avLst/>
-          </a:prstGeom>
-          <a:ln>
-            <a:tailEnd type="triangle"/>
-          </a:ln>
-        </p:spPr>
-        <p:style>
-          <a:lnRef idx="1">
-            <a:schemeClr val="accent1"/>
-          </a:lnRef>
-          <a:fillRef idx="0">
-            <a:schemeClr val="accent1"/>
-          </a:fillRef>
-          <a:effectRef idx="0">
-            <a:schemeClr val="accent1"/>
-          </a:effectRef>
-          <a:fontRef idx="minor">
-            <a:schemeClr val="tx1"/>
-          </a:fontRef>
-        </p:style>
-      </p:cxnSp>
     </p:spTree>
     <p:extLst>
       <p:ext uri="{BB962C8B-B14F-4D97-AF65-F5344CB8AC3E}">
-        <p14:creationId xmlns:p14="http://schemas.microsoft.com/office/powerpoint/2010/main" val="2654454213"/>
+        <p14:creationId xmlns:p14="http://schemas.microsoft.com/office/powerpoint/2010/main" val="1364293928"/>
+      </p:ext>
+    </p:extLst>
+  </p:cSld>
+  <p:clrMapOvr>
+    <a:masterClrMapping/>
+  </p:clrMapOvr>
+</p:sld>
+</file>
+
+<file path=ppt/slides/slide8.xml><?xml version="1.0" encoding="utf-8"?>
+<p:sld xmlns:a="http://schemas.openxmlformats.org/drawingml/2006/main" xmlns:r="http://schemas.openxmlformats.org/officeDocument/2006/relationships" xmlns:p="http://schemas.openxmlformats.org/presentationml/2006/main">
+  <p:cSld>
+    <p:spTree>
+      <p:nvGrpSpPr>
+        <p:cNvPr id="1" name=""/>
+        <p:cNvGrpSpPr/>
+        <p:nvPr/>
+      </p:nvGrpSpPr>
+      <p:grpSpPr>
+        <a:xfrm>
+          <a:off x="0" y="0"/>
+          <a:ext cx="0" cy="0"/>
+          <a:chOff x="0" y="0"/>
+          <a:chExt cx="0" cy="0"/>
+        </a:xfrm>
+      </p:grpSpPr>
+    </p:spTree>
+    <p:extLst>
+      <p:ext uri="{BB962C8B-B14F-4D97-AF65-F5344CB8AC3E}">
+        <p14:creationId xmlns:p14="http://schemas.microsoft.com/office/powerpoint/2010/main" val="1763919738"/>
+      </p:ext>
+    </p:extLst>
+  </p:cSld>
+  <p:clrMapOvr>
+    <a:masterClrMapping/>
+  </p:clrMapOvr>
+</p:sld>
+</file>
+
+<file path=ppt/slides/slide9.xml><?xml version="1.0" encoding="utf-8"?>
+<p:sld xmlns:a="http://schemas.openxmlformats.org/drawingml/2006/main" xmlns:r="http://schemas.openxmlformats.org/officeDocument/2006/relationships" xmlns:p="http://schemas.openxmlformats.org/presentationml/2006/main">
+  <p:cSld>
+    <p:spTree>
+      <p:nvGrpSpPr>
+        <p:cNvPr id="1" name=""/>
+        <p:cNvGrpSpPr/>
+        <p:nvPr/>
+      </p:nvGrpSpPr>
+      <p:grpSpPr>
+        <a:xfrm>
+          <a:off x="0" y="0"/>
+          <a:ext cx="0" cy="0"/>
+          <a:chOff x="0" y="0"/>
+          <a:chExt cx="0" cy="0"/>
+        </a:xfrm>
+      </p:grpSpPr>
+    </p:spTree>
+    <p:extLst>
+      <p:ext uri="{BB962C8B-B14F-4D97-AF65-F5344CB8AC3E}">
+        <p14:creationId xmlns:p14="http://schemas.microsoft.com/office/powerpoint/2010/main" val="1894545992"/>
       </p:ext>
     </p:extLst>
   </p:cSld>
@@ -4785,4 +6519,299 @@
     </a:ext>
   </a:extLst>
 </a:theme>
+</file>
+
+<file path=ppt/theme/theme2.xml><?xml version="1.0" encoding="utf-8"?>
+<a:theme xmlns:a="http://schemas.openxmlformats.org/drawingml/2006/main" name="Office 테마">
+  <a:themeElements>
+    <a:clrScheme name="Office">
+      <a:dk1>
+        <a:sysClr val="windowText" lastClr="000000"/>
+      </a:dk1>
+      <a:lt1>
+        <a:sysClr val="window" lastClr="FFFFFF"/>
+      </a:lt1>
+      <a:dk2>
+        <a:srgbClr val="44546A"/>
+      </a:dk2>
+      <a:lt2>
+        <a:srgbClr val="E7E6E6"/>
+      </a:lt2>
+      <a:accent1>
+        <a:srgbClr val="4472C4"/>
+      </a:accent1>
+      <a:accent2>
+        <a:srgbClr val="ED7D31"/>
+      </a:accent2>
+      <a:accent3>
+        <a:srgbClr val="A5A5A5"/>
+      </a:accent3>
+      <a:accent4>
+        <a:srgbClr val="FFC000"/>
+      </a:accent4>
+      <a:accent5>
+        <a:srgbClr val="5B9BD5"/>
+      </a:accent5>
+      <a:accent6>
+        <a:srgbClr val="70AD47"/>
+      </a:accent6>
+      <a:hlink>
+        <a:srgbClr val="0563C1"/>
+      </a:hlink>
+      <a:folHlink>
+        <a:srgbClr val="954F72"/>
+      </a:folHlink>
+    </a:clrScheme>
+    <a:fontScheme name="Office">
+      <a:majorFont>
+        <a:latin typeface="Calibri Light" panose="020F0302020204030204"/>
+        <a:ea typeface=""/>
+        <a:cs typeface=""/>
+        <a:font script="Jpan" typeface="游ゴシック Light"/>
+        <a:font script="Hang" typeface="맑은 고딕"/>
+        <a:font script="Hans" typeface="等线 Light"/>
+        <a:font script="Hant" typeface="新細明體"/>
+        <a:font script="Arab" typeface="Times New Roman"/>
+        <a:font script="Hebr" typeface="Times New Roman"/>
+        <a:font script="Thai" typeface="Angsana New"/>
+        <a:font script="Ethi" typeface="Nyala"/>
+        <a:font script="Beng" typeface="Vrinda"/>
+        <a:font script="Gujr" typeface="Shruti"/>
+        <a:font script="Khmr" typeface="MoolBoran"/>
+        <a:font script="Knda" typeface="Tunga"/>
+        <a:font script="Guru" typeface="Raavi"/>
+        <a:font script="Cans" typeface="Euphemia"/>
+        <a:font script="Cher" typeface="Plantagenet Cherokee"/>
+        <a:font script="Yiii" typeface="Microsoft Yi Baiti"/>
+        <a:font script="Tibt" typeface="Microsoft Himalaya"/>
+        <a:font script="Thaa" typeface="MV Boli"/>
+        <a:font script="Deva" typeface="Mangal"/>
+        <a:font script="Telu" typeface="Gautami"/>
+        <a:font script="Taml" typeface="Latha"/>
+        <a:font script="Syrc" typeface="Estrangelo Edessa"/>
+        <a:font script="Orya" typeface="Kalinga"/>
+        <a:font script="Mlym" typeface="Kartika"/>
+        <a:font script="Laoo" typeface="DokChampa"/>
+        <a:font script="Sinh" typeface="Iskoola Pota"/>
+        <a:font script="Mong" typeface="Mongolian Baiti"/>
+        <a:font script="Viet" typeface="Times New Roman"/>
+        <a:font script="Uigh" typeface="Microsoft Uighur"/>
+        <a:font script="Geor" typeface="Sylfaen"/>
+        <a:font script="Armn" typeface="Arial"/>
+        <a:font script="Bugi" typeface="Leelawadee UI"/>
+        <a:font script="Bopo" typeface="Microsoft JhengHei"/>
+        <a:font script="Java" typeface="Javanese Text"/>
+        <a:font script="Lisu" typeface="Segoe UI"/>
+        <a:font script="Mymr" typeface="Myanmar Text"/>
+        <a:font script="Nkoo" typeface="Ebrima"/>
+        <a:font script="Olck" typeface="Nirmala UI"/>
+        <a:font script="Osma" typeface="Ebrima"/>
+        <a:font script="Phag" typeface="Phagspa"/>
+        <a:font script="Syrn" typeface="Estrangelo Edessa"/>
+        <a:font script="Syrj" typeface="Estrangelo Edessa"/>
+        <a:font script="Syre" typeface="Estrangelo Edessa"/>
+        <a:font script="Sora" typeface="Nirmala UI"/>
+        <a:font script="Tale" typeface="Microsoft Tai Le"/>
+        <a:font script="Talu" typeface="Microsoft New Tai Lue"/>
+        <a:font script="Tfng" typeface="Ebrima"/>
+      </a:majorFont>
+      <a:minorFont>
+        <a:latin typeface="Calibri" panose="020F0502020204030204"/>
+        <a:ea typeface=""/>
+        <a:cs typeface=""/>
+        <a:font script="Jpan" typeface="游ゴシック"/>
+        <a:font script="Hang" typeface="맑은 고딕"/>
+        <a:font script="Hans" typeface="等线"/>
+        <a:font script="Hant" typeface="新細明體"/>
+        <a:font script="Arab" typeface="Arial"/>
+        <a:font script="Hebr" typeface="Arial"/>
+        <a:font script="Thai" typeface="Cordia New"/>
+        <a:font script="Ethi" typeface="Nyala"/>
+        <a:font script="Beng" typeface="Vrinda"/>
+        <a:font script="Gujr" typeface="Shruti"/>
+        <a:font script="Khmr" typeface="DaunPenh"/>
+        <a:font script="Knda" typeface="Tunga"/>
+        <a:font script="Guru" typeface="Raavi"/>
+        <a:font script="Cans" typeface="Euphemia"/>
+        <a:font script="Cher" typeface="Plantagenet Cherokee"/>
+        <a:font script="Yiii" typeface="Microsoft Yi Baiti"/>
+        <a:font script="Tibt" typeface="Microsoft Himalaya"/>
+        <a:font script="Thaa" typeface="MV Boli"/>
+        <a:font script="Deva" typeface="Mangal"/>
+        <a:font script="Telu" typeface="Gautami"/>
+        <a:font script="Taml" typeface="Latha"/>
+        <a:font script="Syrc" typeface="Estrangelo Edessa"/>
+        <a:font script="Orya" typeface="Kalinga"/>
+        <a:font script="Mlym" typeface="Kartika"/>
+        <a:font script="Laoo" typeface="DokChampa"/>
+        <a:font script="Sinh" typeface="Iskoola Pota"/>
+        <a:font script="Mong" typeface="Mongolian Baiti"/>
+        <a:font script="Viet" typeface="Arial"/>
+        <a:font script="Uigh" typeface="Microsoft Uighur"/>
+        <a:font script="Geor" typeface="Sylfaen"/>
+        <a:font script="Armn" typeface="Arial"/>
+        <a:font script="Bugi" typeface="Leelawadee UI"/>
+        <a:font script="Bopo" typeface="Microsoft JhengHei"/>
+        <a:font script="Java" typeface="Javanese Text"/>
+        <a:font script="Lisu" typeface="Segoe UI"/>
+        <a:font script="Mymr" typeface="Myanmar Text"/>
+        <a:font script="Nkoo" typeface="Ebrima"/>
+        <a:font script="Olck" typeface="Nirmala UI"/>
+        <a:font script="Osma" typeface="Ebrima"/>
+        <a:font script="Phag" typeface="Phagspa"/>
+        <a:font script="Syrn" typeface="Estrangelo Edessa"/>
+        <a:font script="Syrj" typeface="Estrangelo Edessa"/>
+        <a:font script="Syre" typeface="Estrangelo Edessa"/>
+        <a:font script="Sora" typeface="Nirmala UI"/>
+        <a:font script="Tale" typeface="Microsoft Tai Le"/>
+        <a:font script="Talu" typeface="Microsoft New Tai Lue"/>
+        <a:font script="Tfng" typeface="Ebrima"/>
+      </a:minorFont>
+    </a:fontScheme>
+    <a:fmtScheme name="Office">
+      <a:fillStyleLst>
+        <a:solidFill>
+          <a:schemeClr val="phClr"/>
+        </a:solidFill>
+        <a:gradFill rotWithShape="1">
+          <a:gsLst>
+            <a:gs pos="0">
+              <a:schemeClr val="phClr">
+                <a:lumMod val="110000"/>
+                <a:satMod val="105000"/>
+                <a:tint val="67000"/>
+              </a:schemeClr>
+            </a:gs>
+            <a:gs pos="50000">
+              <a:schemeClr val="phClr">
+                <a:lumMod val="105000"/>
+                <a:satMod val="103000"/>
+                <a:tint val="73000"/>
+              </a:schemeClr>
+            </a:gs>
+            <a:gs pos="100000">
+              <a:schemeClr val="phClr">
+                <a:lumMod val="105000"/>
+                <a:satMod val="109000"/>
+                <a:tint val="81000"/>
+              </a:schemeClr>
+            </a:gs>
+          </a:gsLst>
+          <a:lin ang="5400000" scaled="0"/>
+        </a:gradFill>
+        <a:gradFill rotWithShape="1">
+          <a:gsLst>
+            <a:gs pos="0">
+              <a:schemeClr val="phClr">
+                <a:satMod val="103000"/>
+                <a:lumMod val="102000"/>
+                <a:tint val="94000"/>
+              </a:schemeClr>
+            </a:gs>
+            <a:gs pos="50000">
+              <a:schemeClr val="phClr">
+                <a:satMod val="110000"/>
+                <a:lumMod val="100000"/>
+                <a:shade val="100000"/>
+              </a:schemeClr>
+            </a:gs>
+            <a:gs pos="100000">
+              <a:schemeClr val="phClr">
+                <a:lumMod val="99000"/>
+                <a:satMod val="120000"/>
+                <a:shade val="78000"/>
+              </a:schemeClr>
+            </a:gs>
+          </a:gsLst>
+          <a:lin ang="5400000" scaled="0"/>
+        </a:gradFill>
+      </a:fillStyleLst>
+      <a:lnStyleLst>
+        <a:ln w="6350" cap="flat" cmpd="sng" algn="ctr">
+          <a:solidFill>
+            <a:schemeClr val="phClr"/>
+          </a:solidFill>
+          <a:prstDash val="solid"/>
+          <a:miter lim="800000"/>
+        </a:ln>
+        <a:ln w="12700" cap="flat" cmpd="sng" algn="ctr">
+          <a:solidFill>
+            <a:schemeClr val="phClr"/>
+          </a:solidFill>
+          <a:prstDash val="solid"/>
+          <a:miter lim="800000"/>
+        </a:ln>
+        <a:ln w="19050" cap="flat" cmpd="sng" algn="ctr">
+          <a:solidFill>
+            <a:schemeClr val="phClr"/>
+          </a:solidFill>
+          <a:prstDash val="solid"/>
+          <a:miter lim="800000"/>
+        </a:ln>
+      </a:lnStyleLst>
+      <a:effectStyleLst>
+        <a:effectStyle>
+          <a:effectLst/>
+        </a:effectStyle>
+        <a:effectStyle>
+          <a:effectLst/>
+        </a:effectStyle>
+        <a:effectStyle>
+          <a:effectLst>
+            <a:outerShdw blurRad="57150" dist="19050" dir="5400000" algn="ctr" rotWithShape="0">
+              <a:srgbClr val="000000">
+                <a:alpha val="63000"/>
+              </a:srgbClr>
+            </a:outerShdw>
+          </a:effectLst>
+        </a:effectStyle>
+      </a:effectStyleLst>
+      <a:bgFillStyleLst>
+        <a:solidFill>
+          <a:schemeClr val="phClr"/>
+        </a:solidFill>
+        <a:solidFill>
+          <a:schemeClr val="phClr">
+            <a:tint val="95000"/>
+            <a:satMod val="170000"/>
+          </a:schemeClr>
+        </a:solidFill>
+        <a:gradFill rotWithShape="1">
+          <a:gsLst>
+            <a:gs pos="0">
+              <a:schemeClr val="phClr">
+                <a:tint val="93000"/>
+                <a:satMod val="150000"/>
+                <a:shade val="98000"/>
+                <a:lumMod val="102000"/>
+              </a:schemeClr>
+            </a:gs>
+            <a:gs pos="50000">
+              <a:schemeClr val="phClr">
+                <a:tint val="98000"/>
+                <a:satMod val="130000"/>
+                <a:shade val="90000"/>
+                <a:lumMod val="103000"/>
+              </a:schemeClr>
+            </a:gs>
+            <a:gs pos="100000">
+              <a:schemeClr val="phClr">
+                <a:shade val="63000"/>
+                <a:satMod val="120000"/>
+              </a:schemeClr>
+            </a:gs>
+          </a:gsLst>
+          <a:lin ang="5400000" scaled="0"/>
+        </a:gradFill>
+      </a:bgFillStyleLst>
+    </a:fmtScheme>
+  </a:themeElements>
+  <a:objectDefaults/>
+  <a:extraClrSchemeLst/>
+  <a:extLst>
+    <a:ext uri="{05A4C25C-085E-4340-85A3-A5531E510DB2}">
+      <thm15:themeFamily xmlns:thm15="http://schemas.microsoft.com/office/thememl/2012/main" name="Office Theme" id="{62F939B6-93AF-4DB8-9C6B-D6C7DFDC589F}" vid="{4A3C46E8-61CC-4603-A589-7422A47A8E4A}"/>
+    </a:ext>
+  </a:extLst>
+</a:theme>
 </file>
</xml_diff>

<commit_message>
Update | 스프링 AOP
</commit_message>
<xml_diff>
--- a/02-스프링 프레임워크 핵심 기술/assets/image.pptx
+++ b/02-스프링 프레임워크 핵심 기술/assets/image.pptx
@@ -206,7 +206,7 @@
           <a:p>
             <a:fld id="{3BC39B1C-0C05-494F-8C28-819A2C914565}" type="datetimeFigureOut">
               <a:rPr kumimoji="1" lang="ko-Kore-KR" altLang="en-US" smtClean="0"/>
-              <a:t>2021. 5. 23.</a:t>
+              <a:t>2021. 5. 24.</a:t>
             </a:fld>
             <a:endParaRPr kumimoji="1" lang="ko-Kore-KR" altLang="en-US"/>
           </a:p>
@@ -707,7 +707,7 @@
           <a:p>
             <a:fld id="{CD328C22-8105-EF4E-AA44-26483BF34525}" type="datetimeFigureOut">
               <a:rPr kumimoji="1" lang="ko-Kore-KR" altLang="en-US" smtClean="0"/>
-              <a:t>2021. 5. 23.</a:t>
+              <a:t>2021. 5. 24.</a:t>
             </a:fld>
             <a:endParaRPr kumimoji="1" lang="ko-Kore-KR" altLang="en-US"/>
           </a:p>
@@ -907,7 +907,7 @@
           <a:p>
             <a:fld id="{CD328C22-8105-EF4E-AA44-26483BF34525}" type="datetimeFigureOut">
               <a:rPr kumimoji="1" lang="ko-Kore-KR" altLang="en-US" smtClean="0"/>
-              <a:t>2021. 5. 23.</a:t>
+              <a:t>2021. 5. 24.</a:t>
             </a:fld>
             <a:endParaRPr kumimoji="1" lang="ko-Kore-KR" altLang="en-US"/>
           </a:p>
@@ -1117,7 +1117,7 @@
           <a:p>
             <a:fld id="{CD328C22-8105-EF4E-AA44-26483BF34525}" type="datetimeFigureOut">
               <a:rPr kumimoji="1" lang="ko-Kore-KR" altLang="en-US" smtClean="0"/>
-              <a:t>2021. 5. 23.</a:t>
+              <a:t>2021. 5. 24.</a:t>
             </a:fld>
             <a:endParaRPr kumimoji="1" lang="ko-Kore-KR" altLang="en-US"/>
           </a:p>
@@ -1317,7 +1317,7 @@
           <a:p>
             <a:fld id="{CD328C22-8105-EF4E-AA44-26483BF34525}" type="datetimeFigureOut">
               <a:rPr kumimoji="1" lang="ko-Kore-KR" altLang="en-US" smtClean="0"/>
-              <a:t>2021. 5. 23.</a:t>
+              <a:t>2021. 5. 24.</a:t>
             </a:fld>
             <a:endParaRPr kumimoji="1" lang="ko-Kore-KR" altLang="en-US"/>
           </a:p>
@@ -1593,7 +1593,7 @@
           <a:p>
             <a:fld id="{CD328C22-8105-EF4E-AA44-26483BF34525}" type="datetimeFigureOut">
               <a:rPr kumimoji="1" lang="ko-Kore-KR" altLang="en-US" smtClean="0"/>
-              <a:t>2021. 5. 23.</a:t>
+              <a:t>2021. 5. 24.</a:t>
             </a:fld>
             <a:endParaRPr kumimoji="1" lang="ko-Kore-KR" altLang="en-US"/>
           </a:p>
@@ -1861,7 +1861,7 @@
           <a:p>
             <a:fld id="{CD328C22-8105-EF4E-AA44-26483BF34525}" type="datetimeFigureOut">
               <a:rPr kumimoji="1" lang="ko-Kore-KR" altLang="en-US" smtClean="0"/>
-              <a:t>2021. 5. 23.</a:t>
+              <a:t>2021. 5. 24.</a:t>
             </a:fld>
             <a:endParaRPr kumimoji="1" lang="ko-Kore-KR" altLang="en-US"/>
           </a:p>
@@ -2276,7 +2276,7 @@
           <a:p>
             <a:fld id="{CD328C22-8105-EF4E-AA44-26483BF34525}" type="datetimeFigureOut">
               <a:rPr kumimoji="1" lang="ko-Kore-KR" altLang="en-US" smtClean="0"/>
-              <a:t>2021. 5. 23.</a:t>
+              <a:t>2021. 5. 24.</a:t>
             </a:fld>
             <a:endParaRPr kumimoji="1" lang="ko-Kore-KR" altLang="en-US"/>
           </a:p>
@@ -2418,7 +2418,7 @@
           <a:p>
             <a:fld id="{CD328C22-8105-EF4E-AA44-26483BF34525}" type="datetimeFigureOut">
               <a:rPr kumimoji="1" lang="ko-Kore-KR" altLang="en-US" smtClean="0"/>
-              <a:t>2021. 5. 23.</a:t>
+              <a:t>2021. 5. 24.</a:t>
             </a:fld>
             <a:endParaRPr kumimoji="1" lang="ko-Kore-KR" altLang="en-US"/>
           </a:p>
@@ -2531,7 +2531,7 @@
           <a:p>
             <a:fld id="{CD328C22-8105-EF4E-AA44-26483BF34525}" type="datetimeFigureOut">
               <a:rPr kumimoji="1" lang="ko-Kore-KR" altLang="en-US" smtClean="0"/>
-              <a:t>2021. 5. 23.</a:t>
+              <a:t>2021. 5. 24.</a:t>
             </a:fld>
             <a:endParaRPr kumimoji="1" lang="ko-Kore-KR" altLang="en-US"/>
           </a:p>
@@ -2844,7 +2844,7 @@
           <a:p>
             <a:fld id="{CD328C22-8105-EF4E-AA44-26483BF34525}" type="datetimeFigureOut">
               <a:rPr kumimoji="1" lang="ko-Kore-KR" altLang="en-US" smtClean="0"/>
-              <a:t>2021. 5. 23.</a:t>
+              <a:t>2021. 5. 24.</a:t>
             </a:fld>
             <a:endParaRPr kumimoji="1" lang="ko-Kore-KR" altLang="en-US"/>
           </a:p>
@@ -3133,7 +3133,7 @@
           <a:p>
             <a:fld id="{CD328C22-8105-EF4E-AA44-26483BF34525}" type="datetimeFigureOut">
               <a:rPr kumimoji="1" lang="ko-Kore-KR" altLang="en-US" smtClean="0"/>
-              <a:t>2021. 5. 23.</a:t>
+              <a:t>2021. 5. 24.</a:t>
             </a:fld>
             <a:endParaRPr kumimoji="1" lang="ko-Kore-KR" altLang="en-US"/>
           </a:p>
@@ -3376,7 +3376,7 @@
           <a:p>
             <a:fld id="{CD328C22-8105-EF4E-AA44-26483BF34525}" type="datetimeFigureOut">
               <a:rPr kumimoji="1" lang="ko-Kore-KR" altLang="en-US" smtClean="0"/>
-              <a:t>2021. 5. 23.</a:t>
+              <a:t>2021. 5. 24.</a:t>
             </a:fld>
             <a:endParaRPr kumimoji="1" lang="ko-Kore-KR" altLang="en-US"/>
           </a:p>
@@ -6153,6 +6153,220 @@
           <a:chExt cx="0" cy="0"/>
         </a:xfrm>
       </p:grpSpPr>
+      <p:sp>
+        <p:nvSpPr>
+          <p:cNvPr id="3" name="직사각형 2">
+            <a:extLst>
+              <a:ext uri="{FF2B5EF4-FFF2-40B4-BE49-F238E27FC236}">
+                <a16:creationId xmlns:a16="http://schemas.microsoft.com/office/drawing/2014/main" id="{BA228DC5-E5CE-2B45-8E62-44AF020D58FD}"/>
+              </a:ext>
+            </a:extLst>
+          </p:cNvPr>
+          <p:cNvSpPr/>
+          <p:nvPr/>
+        </p:nvSpPr>
+        <p:spPr>
+          <a:xfrm>
+            <a:off x="1464907" y="1278293"/>
+            <a:ext cx="1343608" cy="1418254"/>
+          </a:xfrm>
+          <a:prstGeom prst="rect">
+            <a:avLst/>
+          </a:prstGeom>
+        </p:spPr>
+        <p:style>
+          <a:lnRef idx="2">
+            <a:schemeClr val="accent1">
+              <a:shade val="50000"/>
+            </a:schemeClr>
+          </a:lnRef>
+          <a:fillRef idx="1">
+            <a:schemeClr val="accent1"/>
+          </a:fillRef>
+          <a:effectRef idx="0">
+            <a:schemeClr val="accent1"/>
+          </a:effectRef>
+          <a:fontRef idx="minor">
+            <a:schemeClr val="lt1"/>
+          </a:fontRef>
+        </p:style>
+        <p:txBody>
+          <a:bodyPr rtlCol="0" anchor="ctr"/>
+          <a:lstStyle/>
+          <a:p>
+            <a:pPr algn="ctr"/>
+            <a:r>
+              <a:rPr kumimoji="1" lang="en-US" altLang="ko-Kore-KR" dirty="0"/>
+              <a:t>Client</a:t>
+            </a:r>
+            <a:endParaRPr kumimoji="1" lang="ko-Kore-KR" altLang="en-US" dirty="0"/>
+          </a:p>
+        </p:txBody>
+      </p:sp>
+      <p:sp>
+        <p:nvSpPr>
+          <p:cNvPr id="5" name="직사각형 4">
+            <a:extLst>
+              <a:ext uri="{FF2B5EF4-FFF2-40B4-BE49-F238E27FC236}">
+                <a16:creationId xmlns:a16="http://schemas.microsoft.com/office/drawing/2014/main" id="{0649CB7B-773A-1C43-B366-CDA6B0047B48}"/>
+              </a:ext>
+            </a:extLst>
+          </p:cNvPr>
+          <p:cNvSpPr/>
+          <p:nvPr/>
+        </p:nvSpPr>
+        <p:spPr>
+          <a:xfrm>
+            <a:off x="4544014" y="1278293"/>
+            <a:ext cx="2304660" cy="1418254"/>
+          </a:xfrm>
+          <a:prstGeom prst="rect">
+            <a:avLst/>
+          </a:prstGeom>
+        </p:spPr>
+        <p:style>
+          <a:lnRef idx="2">
+            <a:schemeClr val="accent1">
+              <a:shade val="50000"/>
+            </a:schemeClr>
+          </a:lnRef>
+          <a:fillRef idx="1">
+            <a:schemeClr val="accent1"/>
+          </a:fillRef>
+          <a:effectRef idx="0">
+            <a:schemeClr val="accent1"/>
+          </a:effectRef>
+          <a:fontRef idx="minor">
+            <a:schemeClr val="lt1"/>
+          </a:fontRef>
+        </p:style>
+        <p:txBody>
+          <a:bodyPr rtlCol="0" anchor="ctr"/>
+          <a:lstStyle/>
+          <a:p>
+            <a:pPr algn="ctr"/>
+            <a:r>
+              <a:rPr kumimoji="1" lang="en-US" altLang="ko-Kore-KR" dirty="0"/>
+              <a:t>&lt;Interface&gt;</a:t>
+            </a:r>
+          </a:p>
+          <a:p>
+            <a:pPr algn="ctr"/>
+            <a:r>
+              <a:rPr kumimoji="1" lang="en-US" altLang="ko-Kore-KR" dirty="0"/>
+              <a:t>Subject</a:t>
+            </a:r>
+            <a:endParaRPr kumimoji="1" lang="ko-Kore-KR" altLang="en-US" dirty="0"/>
+          </a:p>
+        </p:txBody>
+      </p:sp>
+      <p:sp>
+        <p:nvSpPr>
+          <p:cNvPr id="6" name="직사각형 5">
+            <a:extLst>
+              <a:ext uri="{FF2B5EF4-FFF2-40B4-BE49-F238E27FC236}">
+                <a16:creationId xmlns:a16="http://schemas.microsoft.com/office/drawing/2014/main" id="{100974D8-AE45-0044-91EE-48ADF2E7395E}"/>
+              </a:ext>
+            </a:extLst>
+          </p:cNvPr>
+          <p:cNvSpPr/>
+          <p:nvPr/>
+        </p:nvSpPr>
+        <p:spPr>
+          <a:xfrm>
+            <a:off x="6226633" y="3606283"/>
+            <a:ext cx="1343608" cy="1418254"/>
+          </a:xfrm>
+          <a:prstGeom prst="rect">
+            <a:avLst/>
+          </a:prstGeom>
+        </p:spPr>
+        <p:style>
+          <a:lnRef idx="2">
+            <a:schemeClr val="accent1">
+              <a:shade val="50000"/>
+            </a:schemeClr>
+          </a:lnRef>
+          <a:fillRef idx="1">
+            <a:schemeClr val="accent1"/>
+          </a:fillRef>
+          <a:effectRef idx="0">
+            <a:schemeClr val="accent1"/>
+          </a:effectRef>
+          <a:fontRef idx="minor">
+            <a:schemeClr val="lt1"/>
+          </a:fontRef>
+        </p:style>
+        <p:txBody>
+          <a:bodyPr rtlCol="0" anchor="ctr"/>
+          <a:lstStyle/>
+          <a:p>
+            <a:pPr algn="ctr"/>
+            <a:r>
+              <a:rPr kumimoji="1" lang="en-US" altLang="ko-Kore-KR" dirty="0"/>
+              <a:t>Real</a:t>
+            </a:r>
+          </a:p>
+          <a:p>
+            <a:pPr algn="ctr"/>
+            <a:r>
+              <a:rPr kumimoji="1" lang="en-US" altLang="ko-Kore-KR" dirty="0"/>
+              <a:t>Subject</a:t>
+            </a:r>
+            <a:endParaRPr kumimoji="1" lang="ko-Kore-KR" altLang="en-US" dirty="0"/>
+          </a:p>
+        </p:txBody>
+      </p:sp>
+      <p:sp>
+        <p:nvSpPr>
+          <p:cNvPr id="7" name="직사각형 6">
+            <a:extLst>
+              <a:ext uri="{FF2B5EF4-FFF2-40B4-BE49-F238E27FC236}">
+                <a16:creationId xmlns:a16="http://schemas.microsoft.com/office/drawing/2014/main" id="{2647EB37-3E6A-C140-8DF6-6821AD2CA799}"/>
+              </a:ext>
+            </a:extLst>
+          </p:cNvPr>
+          <p:cNvSpPr/>
+          <p:nvPr/>
+        </p:nvSpPr>
+        <p:spPr>
+          <a:xfrm>
+            <a:off x="3834886" y="3606283"/>
+            <a:ext cx="1343608" cy="1418254"/>
+          </a:xfrm>
+          <a:prstGeom prst="rect">
+            <a:avLst/>
+          </a:prstGeom>
+        </p:spPr>
+        <p:style>
+          <a:lnRef idx="2">
+            <a:schemeClr val="accent1">
+              <a:shade val="50000"/>
+            </a:schemeClr>
+          </a:lnRef>
+          <a:fillRef idx="1">
+            <a:schemeClr val="accent1"/>
+          </a:fillRef>
+          <a:effectRef idx="0">
+            <a:schemeClr val="accent1"/>
+          </a:effectRef>
+          <a:fontRef idx="minor">
+            <a:schemeClr val="lt1"/>
+          </a:fontRef>
+        </p:style>
+        <p:txBody>
+          <a:bodyPr rtlCol="0" anchor="ctr"/>
+          <a:lstStyle/>
+          <a:p>
+            <a:pPr algn="ctr"/>
+            <a:r>
+              <a:rPr kumimoji="1" lang="en-US" altLang="ko-Kore-KR" dirty="0"/>
+              <a:t>Proxy</a:t>
+            </a:r>
+            <a:endParaRPr kumimoji="1" lang="ko-Kore-KR" altLang="en-US" dirty="0"/>
+          </a:p>
+        </p:txBody>
+      </p:sp>
     </p:spTree>
     <p:extLst>
       <p:ext uri="{BB962C8B-B14F-4D97-AF65-F5344CB8AC3E}">

</xml_diff>

<commit_message>
Update | Null Safety
</commit_message>
<xml_diff>
--- a/02-스프링 프레임워크 핵심 기술/assets/image.pptx
+++ b/02-스프링 프레임워크 핵심 기술/assets/image.pptx
@@ -6173,6 +6173,12 @@
           <a:prstGeom prst="rect">
             <a:avLst/>
           </a:prstGeom>
+          <a:solidFill>
+            <a:schemeClr val="accent1"/>
+          </a:solidFill>
+          <a:ln>
+            <a:noFill/>
+          </a:ln>
         </p:spPr>
         <p:style>
           <a:lnRef idx="2">
@@ -6196,10 +6202,10 @@
           <a:p>
             <a:pPr algn="ctr"/>
             <a:r>
-              <a:rPr kumimoji="1" lang="en-US" altLang="ko-Kore-KR" dirty="0"/>
+              <a:rPr kumimoji="1" lang="en-US" altLang="ko-Kore-KR" sz="2400" dirty="0"/>
               <a:t>Client</a:t>
             </a:r>
-            <a:endParaRPr kumimoji="1" lang="ko-Kore-KR" altLang="en-US" dirty="0"/>
+            <a:endParaRPr kumimoji="1" lang="ko-Kore-KR" altLang="en-US" sz="2400" dirty="0"/>
           </a:p>
         </p:txBody>
       </p:sp>
@@ -6223,6 +6229,14 @@
           <a:prstGeom prst="rect">
             <a:avLst/>
           </a:prstGeom>
+          <a:solidFill>
+            <a:schemeClr val="accent6">
+              <a:lumMod val="75000"/>
+            </a:schemeClr>
+          </a:solidFill>
+          <a:ln>
+            <a:noFill/>
+          </a:ln>
         </p:spPr>
         <p:style>
           <a:lnRef idx="2">
@@ -6246,17 +6260,17 @@
           <a:p>
             <a:pPr algn="ctr"/>
             <a:r>
-              <a:rPr kumimoji="1" lang="en-US" altLang="ko-Kore-KR" dirty="0"/>
+              <a:rPr kumimoji="1" lang="en-US" altLang="ko-Kore-KR" sz="2400" dirty="0"/>
               <a:t>&lt;Interface&gt;</a:t>
             </a:r>
           </a:p>
           <a:p>
             <a:pPr algn="ctr"/>
             <a:r>
-              <a:rPr kumimoji="1" lang="en-US" altLang="ko-Kore-KR" dirty="0"/>
+              <a:rPr kumimoji="1" lang="en-US" altLang="ko-Kore-KR" sz="2400" dirty="0"/>
               <a:t>Subject</a:t>
             </a:r>
-            <a:endParaRPr kumimoji="1" lang="ko-Kore-KR" altLang="en-US" dirty="0"/>
+            <a:endParaRPr kumimoji="1" lang="ko-Kore-KR" altLang="en-US" sz="2400" dirty="0"/>
           </a:p>
         </p:txBody>
       </p:sp>
@@ -6280,6 +6294,14 @@
           <a:prstGeom prst="rect">
             <a:avLst/>
           </a:prstGeom>
+          <a:solidFill>
+            <a:schemeClr val="accent6">
+              <a:lumMod val="75000"/>
+            </a:schemeClr>
+          </a:solidFill>
+          <a:ln>
+            <a:noFill/>
+          </a:ln>
         </p:spPr>
         <p:style>
           <a:lnRef idx="2">
@@ -6303,17 +6325,17 @@
           <a:p>
             <a:pPr algn="ctr"/>
             <a:r>
-              <a:rPr kumimoji="1" lang="en-US" altLang="ko-Kore-KR" dirty="0"/>
+              <a:rPr kumimoji="1" lang="en-US" altLang="ko-Kore-KR" sz="2400" dirty="0"/>
               <a:t>Real</a:t>
             </a:r>
           </a:p>
           <a:p>
             <a:pPr algn="ctr"/>
             <a:r>
-              <a:rPr kumimoji="1" lang="en-US" altLang="ko-Kore-KR" dirty="0"/>
+              <a:rPr kumimoji="1" lang="en-US" altLang="ko-Kore-KR" sz="2400" dirty="0"/>
               <a:t>Subject</a:t>
             </a:r>
-            <a:endParaRPr kumimoji="1" lang="ko-Kore-KR" altLang="en-US" dirty="0"/>
+            <a:endParaRPr kumimoji="1" lang="ko-Kore-KR" altLang="en-US" sz="2400" dirty="0"/>
           </a:p>
         </p:txBody>
       </p:sp>
@@ -6337,6 +6359,14 @@
           <a:prstGeom prst="rect">
             <a:avLst/>
           </a:prstGeom>
+          <a:solidFill>
+            <a:schemeClr val="accent6">
+              <a:lumMod val="75000"/>
+            </a:schemeClr>
+          </a:solidFill>
+          <a:ln>
+            <a:noFill/>
+          </a:ln>
         </p:spPr>
         <p:style>
           <a:lnRef idx="2">
@@ -6360,13 +6390,184 @@
           <a:p>
             <a:pPr algn="ctr"/>
             <a:r>
-              <a:rPr kumimoji="1" lang="en-US" altLang="ko-Kore-KR" dirty="0"/>
+              <a:rPr kumimoji="1" lang="en-US" altLang="ko-Kore-KR" sz="2400" dirty="0"/>
               <a:t>Proxy</a:t>
             </a:r>
-            <a:endParaRPr kumimoji="1" lang="ko-Kore-KR" altLang="en-US" dirty="0"/>
-          </a:p>
-        </p:txBody>
-      </p:sp>
+            <a:endParaRPr kumimoji="1" lang="ko-Kore-KR" altLang="en-US" sz="2400" dirty="0"/>
+          </a:p>
+        </p:txBody>
+      </p:sp>
+      <p:cxnSp>
+        <p:nvCxnSpPr>
+          <p:cNvPr id="9" name="직선 화살표 연결선 8">
+            <a:extLst>
+              <a:ext uri="{FF2B5EF4-FFF2-40B4-BE49-F238E27FC236}">
+                <a16:creationId xmlns:a16="http://schemas.microsoft.com/office/drawing/2014/main" id="{25F0A80E-408F-EB43-A81E-A12B319B7819}"/>
+              </a:ext>
+            </a:extLst>
+          </p:cNvPr>
+          <p:cNvCxnSpPr>
+            <a:stCxn id="3" idx="3"/>
+            <a:endCxn id="5" idx="1"/>
+          </p:cNvCxnSpPr>
+          <p:nvPr/>
+        </p:nvCxnSpPr>
+        <p:spPr>
+          <a:xfrm>
+            <a:off x="2808515" y="1987420"/>
+            <a:ext cx="1735499" cy="0"/>
+          </a:xfrm>
+          <a:prstGeom prst="straightConnector1">
+            <a:avLst/>
+          </a:prstGeom>
+          <a:ln w="19050">
+            <a:tailEnd type="triangle"/>
+          </a:ln>
+        </p:spPr>
+        <p:style>
+          <a:lnRef idx="1">
+            <a:schemeClr val="accent1"/>
+          </a:lnRef>
+          <a:fillRef idx="0">
+            <a:schemeClr val="accent1"/>
+          </a:fillRef>
+          <a:effectRef idx="0">
+            <a:schemeClr val="accent1"/>
+          </a:effectRef>
+          <a:fontRef idx="minor">
+            <a:schemeClr val="tx1"/>
+          </a:fontRef>
+        </p:style>
+      </p:cxnSp>
+      <p:cxnSp>
+        <p:nvCxnSpPr>
+          <p:cNvPr id="10" name="직선 화살표 연결선 9">
+            <a:extLst>
+              <a:ext uri="{FF2B5EF4-FFF2-40B4-BE49-F238E27FC236}">
+                <a16:creationId xmlns:a16="http://schemas.microsoft.com/office/drawing/2014/main" id="{3E09FA65-C9A1-4742-B234-157B85A3EA43}"/>
+              </a:ext>
+            </a:extLst>
+          </p:cNvPr>
+          <p:cNvCxnSpPr>
+            <a:cxnSpLocks/>
+            <a:stCxn id="7" idx="0"/>
+            <a:endCxn id="5" idx="2"/>
+          </p:cNvCxnSpPr>
+          <p:nvPr/>
+        </p:nvCxnSpPr>
+        <p:spPr>
+          <a:xfrm flipV="1">
+            <a:off x="4506690" y="2696547"/>
+            <a:ext cx="1189654" cy="909736"/>
+          </a:xfrm>
+          <a:prstGeom prst="straightConnector1">
+            <a:avLst/>
+          </a:prstGeom>
+          <a:ln w="19050">
+            <a:tailEnd type="triangle"/>
+          </a:ln>
+        </p:spPr>
+        <p:style>
+          <a:lnRef idx="1">
+            <a:schemeClr val="accent1"/>
+          </a:lnRef>
+          <a:fillRef idx="0">
+            <a:schemeClr val="accent1"/>
+          </a:fillRef>
+          <a:effectRef idx="0">
+            <a:schemeClr val="accent1"/>
+          </a:effectRef>
+          <a:fontRef idx="minor">
+            <a:schemeClr val="tx1"/>
+          </a:fontRef>
+        </p:style>
+      </p:cxnSp>
+      <p:cxnSp>
+        <p:nvCxnSpPr>
+          <p:cNvPr id="14" name="직선 화살표 연결선 13">
+            <a:extLst>
+              <a:ext uri="{FF2B5EF4-FFF2-40B4-BE49-F238E27FC236}">
+                <a16:creationId xmlns:a16="http://schemas.microsoft.com/office/drawing/2014/main" id="{98D8DF9E-9E83-0E4F-AE8E-DE9DAB1AA139}"/>
+              </a:ext>
+            </a:extLst>
+          </p:cNvPr>
+          <p:cNvCxnSpPr>
+            <a:cxnSpLocks/>
+            <a:stCxn id="6" idx="0"/>
+            <a:endCxn id="5" idx="2"/>
+          </p:cNvCxnSpPr>
+          <p:nvPr/>
+        </p:nvCxnSpPr>
+        <p:spPr>
+          <a:xfrm flipH="1" flipV="1">
+            <a:off x="5696344" y="2696547"/>
+            <a:ext cx="1202093" cy="909736"/>
+          </a:xfrm>
+          <a:prstGeom prst="straightConnector1">
+            <a:avLst/>
+          </a:prstGeom>
+          <a:ln w="19050">
+            <a:tailEnd type="triangle"/>
+          </a:ln>
+        </p:spPr>
+        <p:style>
+          <a:lnRef idx="1">
+            <a:schemeClr val="accent1"/>
+          </a:lnRef>
+          <a:fillRef idx="0">
+            <a:schemeClr val="accent1"/>
+          </a:fillRef>
+          <a:effectRef idx="0">
+            <a:schemeClr val="accent1"/>
+          </a:effectRef>
+          <a:fontRef idx="minor">
+            <a:schemeClr val="tx1"/>
+          </a:fontRef>
+        </p:style>
+      </p:cxnSp>
+      <p:cxnSp>
+        <p:nvCxnSpPr>
+          <p:cNvPr id="17" name="직선 화살표 연결선 16">
+            <a:extLst>
+              <a:ext uri="{FF2B5EF4-FFF2-40B4-BE49-F238E27FC236}">
+                <a16:creationId xmlns:a16="http://schemas.microsoft.com/office/drawing/2014/main" id="{51FB181B-A49E-C244-A123-6F83146F403E}"/>
+              </a:ext>
+            </a:extLst>
+          </p:cNvPr>
+          <p:cNvCxnSpPr>
+            <a:cxnSpLocks/>
+            <a:stCxn id="7" idx="3"/>
+            <a:endCxn id="6" idx="1"/>
+          </p:cNvCxnSpPr>
+          <p:nvPr/>
+        </p:nvCxnSpPr>
+        <p:spPr>
+          <a:xfrm>
+            <a:off x="5178494" y="4315410"/>
+            <a:ext cx="1048139" cy="0"/>
+          </a:xfrm>
+          <a:prstGeom prst="straightConnector1">
+            <a:avLst/>
+          </a:prstGeom>
+          <a:ln w="19050">
+            <a:tailEnd type="triangle"/>
+          </a:ln>
+        </p:spPr>
+        <p:style>
+          <a:lnRef idx="1">
+            <a:schemeClr val="accent1"/>
+          </a:lnRef>
+          <a:fillRef idx="0">
+            <a:schemeClr val="accent1"/>
+          </a:fillRef>
+          <a:effectRef idx="0">
+            <a:schemeClr val="accent1"/>
+          </a:effectRef>
+          <a:fontRef idx="minor">
+            <a:schemeClr val="tx1"/>
+          </a:fontRef>
+        </p:style>
+      </p:cxnSp>
     </p:spTree>
     <p:extLst>
       <p:ext uri="{BB962C8B-B14F-4D97-AF65-F5344CB8AC3E}">
@@ -6397,6 +6598,36 @@
           <a:chExt cx="0" cy="0"/>
         </a:xfrm>
       </p:grpSpPr>
+      <p:pic>
+        <p:nvPicPr>
+          <p:cNvPr id="3" name="그림 2">
+            <a:extLst>
+              <a:ext uri="{FF2B5EF4-FFF2-40B4-BE49-F238E27FC236}">
+                <a16:creationId xmlns:a16="http://schemas.microsoft.com/office/drawing/2014/main" id="{00A00068-9C40-AE44-84D9-6A6E173D1B9B}"/>
+              </a:ext>
+            </a:extLst>
+          </p:cNvPr>
+          <p:cNvPicPr>
+            <a:picLocks noChangeAspect="1"/>
+          </p:cNvPicPr>
+          <p:nvPr/>
+        </p:nvPicPr>
+        <p:blipFill>
+          <a:blip r:embed="rId2"/>
+          <a:stretch>
+            <a:fillRect/>
+          </a:stretch>
+        </p:blipFill>
+        <p:spPr>
+          <a:xfrm>
+            <a:off x="895621" y="0"/>
+            <a:ext cx="10400758" cy="6858000"/>
+          </a:xfrm>
+          <a:prstGeom prst="rect">
+            <a:avLst/>
+          </a:prstGeom>
+        </p:spPr>
+      </p:pic>
     </p:spTree>
     <p:extLst>
       <p:ext uri="{BB962C8B-B14F-4D97-AF65-F5344CB8AC3E}">

</xml_diff>